<commit_message>
COLLISION DETECTION AND MOVEMENT: Implemented basic collision detection for water and updated movement to wrap around creating a fake "world".
</commit_message>
<xml_diff>
--- a/src/uk/dangrew/dinosaurs/resources/image-construction.pptx
+++ b/src/uk/dangrew/dinosaurs/resources/image-construction.pptx
@@ -6,7 +6,8 @@
   </p:sldMasterIdLst>
   <p:sldIdLst>
     <p:sldId id="257" r:id="rId2"/>
-    <p:sldId id="256" r:id="rId3"/>
+    <p:sldId id="258" r:id="rId3"/>
+    <p:sldId id="256" r:id="rId4"/>
   </p:sldIdLst>
   <p:sldSz cx="12192000" cy="6858000"/>
   <p:notesSz cx="6858000" cy="9144000"/>
@@ -105,6 +106,11 @@
       </a:defRPr>
     </a:lvl9pPr>
   </p:defaultTextStyle>
+  <p:extLst>
+    <p:ext uri="{EFAFB233-063F-42B5-8137-9DF3F51BA10A}">
+      <p15:sldGuideLst xmlns:p15="http://schemas.microsoft.com/office/powerpoint/2012/main"/>
+    </p:ext>
+  </p:extLst>
 </p:presentation>
 </file>
 
@@ -257,7 +263,7 @@
           <a:p>
             <a:fld id="{3BCC14AE-D617-41D5-BCF6-6DE6B30EE28B}" type="datetimeFigureOut">
               <a:rPr lang="en-GB" smtClean="0"/>
-              <a:t>12/01/2021</a:t>
+              <a:t>14/01/2021</a:t>
             </a:fld>
             <a:endParaRPr lang="en-GB"/>
           </a:p>
@@ -457,7 +463,7 @@
           <a:p>
             <a:fld id="{3BCC14AE-D617-41D5-BCF6-6DE6B30EE28B}" type="datetimeFigureOut">
               <a:rPr lang="en-GB" smtClean="0"/>
-              <a:t>12/01/2021</a:t>
+              <a:t>14/01/2021</a:t>
             </a:fld>
             <a:endParaRPr lang="en-GB"/>
           </a:p>
@@ -667,7 +673,7 @@
           <a:p>
             <a:fld id="{3BCC14AE-D617-41D5-BCF6-6DE6B30EE28B}" type="datetimeFigureOut">
               <a:rPr lang="en-GB" smtClean="0"/>
-              <a:t>12/01/2021</a:t>
+              <a:t>14/01/2021</a:t>
             </a:fld>
             <a:endParaRPr lang="en-GB"/>
           </a:p>
@@ -867,7 +873,7 @@
           <a:p>
             <a:fld id="{3BCC14AE-D617-41D5-BCF6-6DE6B30EE28B}" type="datetimeFigureOut">
               <a:rPr lang="en-GB" smtClean="0"/>
-              <a:t>12/01/2021</a:t>
+              <a:t>14/01/2021</a:t>
             </a:fld>
             <a:endParaRPr lang="en-GB"/>
           </a:p>
@@ -1143,7 +1149,7 @@
           <a:p>
             <a:fld id="{3BCC14AE-D617-41D5-BCF6-6DE6B30EE28B}" type="datetimeFigureOut">
               <a:rPr lang="en-GB" smtClean="0"/>
-              <a:t>12/01/2021</a:t>
+              <a:t>14/01/2021</a:t>
             </a:fld>
             <a:endParaRPr lang="en-GB"/>
           </a:p>
@@ -1411,7 +1417,7 @@
           <a:p>
             <a:fld id="{3BCC14AE-D617-41D5-BCF6-6DE6B30EE28B}" type="datetimeFigureOut">
               <a:rPr lang="en-GB" smtClean="0"/>
-              <a:t>12/01/2021</a:t>
+              <a:t>14/01/2021</a:t>
             </a:fld>
             <a:endParaRPr lang="en-GB"/>
           </a:p>
@@ -1826,7 +1832,7 @@
           <a:p>
             <a:fld id="{3BCC14AE-D617-41D5-BCF6-6DE6B30EE28B}" type="datetimeFigureOut">
               <a:rPr lang="en-GB" smtClean="0"/>
-              <a:t>12/01/2021</a:t>
+              <a:t>14/01/2021</a:t>
             </a:fld>
             <a:endParaRPr lang="en-GB"/>
           </a:p>
@@ -1968,7 +1974,7 @@
           <a:p>
             <a:fld id="{3BCC14AE-D617-41D5-BCF6-6DE6B30EE28B}" type="datetimeFigureOut">
               <a:rPr lang="en-GB" smtClean="0"/>
-              <a:t>12/01/2021</a:t>
+              <a:t>14/01/2021</a:t>
             </a:fld>
             <a:endParaRPr lang="en-GB"/>
           </a:p>
@@ -2081,7 +2087,7 @@
           <a:p>
             <a:fld id="{3BCC14AE-D617-41D5-BCF6-6DE6B30EE28B}" type="datetimeFigureOut">
               <a:rPr lang="en-GB" smtClean="0"/>
-              <a:t>12/01/2021</a:t>
+              <a:t>14/01/2021</a:t>
             </a:fld>
             <a:endParaRPr lang="en-GB"/>
           </a:p>
@@ -2394,7 +2400,7 @@
           <a:p>
             <a:fld id="{3BCC14AE-D617-41D5-BCF6-6DE6B30EE28B}" type="datetimeFigureOut">
               <a:rPr lang="en-GB" smtClean="0"/>
-              <a:t>12/01/2021</a:t>
+              <a:t>14/01/2021</a:t>
             </a:fld>
             <a:endParaRPr lang="en-GB"/>
           </a:p>
@@ -2683,7 +2689,7 @@
           <a:p>
             <a:fld id="{3BCC14AE-D617-41D5-BCF6-6DE6B30EE28B}" type="datetimeFigureOut">
               <a:rPr lang="en-GB" smtClean="0"/>
-              <a:t>12/01/2021</a:t>
+              <a:t>14/01/2021</a:t>
             </a:fld>
             <a:endParaRPr lang="en-GB"/>
           </a:p>
@@ -2926,7 +2932,7 @@
           <a:p>
             <a:fld id="{3BCC14AE-D617-41D5-BCF6-6DE6B30EE28B}" type="datetimeFigureOut">
               <a:rPr lang="en-GB" smtClean="0"/>
-              <a:t>12/01/2021</a:t>
+              <a:t>14/01/2021</a:t>
             </a:fld>
             <a:endParaRPr lang="en-GB"/>
           </a:p>
@@ -3343,6 +3349,36 @@
           <a:chExt cx="0" cy="0"/>
         </a:xfrm>
       </p:grpSpPr>
+    </p:spTree>
+    <p:extLst>
+      <p:ext uri="{BB962C8B-B14F-4D97-AF65-F5344CB8AC3E}">
+        <p14:creationId xmlns:p14="http://schemas.microsoft.com/office/powerpoint/2010/main" val="1025106934"/>
+      </p:ext>
+    </p:extLst>
+  </p:cSld>
+  <p:clrMapOvr>
+    <a:masterClrMapping/>
+  </p:clrMapOvr>
+</p:sld>
+</file>
+
+<file path=ppt/slides/slide2.xml><?xml version="1.0" encoding="utf-8"?>
+<p:sld xmlns:a="http://schemas.openxmlformats.org/drawingml/2006/main" xmlns:r="http://schemas.openxmlformats.org/officeDocument/2006/relationships" xmlns:p="http://schemas.openxmlformats.org/presentationml/2006/main">
+  <p:cSld>
+    <p:spTree>
+      <p:nvGrpSpPr>
+        <p:cNvPr id="1" name=""/>
+        <p:cNvGrpSpPr/>
+        <p:nvPr/>
+      </p:nvGrpSpPr>
+      <p:grpSpPr>
+        <a:xfrm>
+          <a:off x="0" y="0"/>
+          <a:ext cx="0" cy="0"/>
+          <a:chOff x="0" y="0"/>
+          <a:chExt cx="0" cy="0"/>
+        </a:xfrm>
+      </p:grpSpPr>
       <p:sp>
         <p:nvSpPr>
           <p:cNvPr id="6" name="Moon 5">
@@ -4996,7 +5032,7 @@
     </p:spTree>
     <p:extLst>
       <p:ext uri="{BB962C8B-B14F-4D97-AF65-F5344CB8AC3E}">
-        <p14:creationId xmlns:p14="http://schemas.microsoft.com/office/powerpoint/2010/main" val="1025106934"/>
+        <p14:creationId xmlns:p14="http://schemas.microsoft.com/office/powerpoint/2010/main" val="3769268982"/>
       </p:ext>
     </p:extLst>
   </p:cSld>
@@ -5006,7 +5042,7 @@
 </p:sld>
 </file>
 
-<file path=ppt/slides/slide2.xml><?xml version="1.0" encoding="utf-8"?>
+<file path=ppt/slides/slide3.xml><?xml version="1.0" encoding="utf-8"?>
 <p:sld xmlns:a="http://schemas.openxmlformats.org/drawingml/2006/main" xmlns:r="http://schemas.openxmlformats.org/officeDocument/2006/relationships" xmlns:p="http://schemas.openxmlformats.org/presentationml/2006/main">
   <p:cSld>
     <p:spTree>

</xml_diff>

<commit_message>
TREES AND BUILDERS: Added trees providing another collidable, and added builders for trees and water(s).
</commit_message>
<xml_diff>
--- a/src/uk/dangrew/dinosaurs/resources/image-construction.pptx
+++ b/src/uk/dangrew/dinosaurs/resources/image-construction.pptx
@@ -263,7 +263,7 @@
           <a:p>
             <a:fld id="{3BCC14AE-D617-41D5-BCF6-6DE6B30EE28B}" type="datetimeFigureOut">
               <a:rPr lang="en-GB" smtClean="0"/>
-              <a:t>14/01/2021</a:t>
+              <a:t>16/01/2021</a:t>
             </a:fld>
             <a:endParaRPr lang="en-GB"/>
           </a:p>
@@ -463,7 +463,7 @@
           <a:p>
             <a:fld id="{3BCC14AE-D617-41D5-BCF6-6DE6B30EE28B}" type="datetimeFigureOut">
               <a:rPr lang="en-GB" smtClean="0"/>
-              <a:t>14/01/2021</a:t>
+              <a:t>16/01/2021</a:t>
             </a:fld>
             <a:endParaRPr lang="en-GB"/>
           </a:p>
@@ -673,7 +673,7 @@
           <a:p>
             <a:fld id="{3BCC14AE-D617-41D5-BCF6-6DE6B30EE28B}" type="datetimeFigureOut">
               <a:rPr lang="en-GB" smtClean="0"/>
-              <a:t>14/01/2021</a:t>
+              <a:t>16/01/2021</a:t>
             </a:fld>
             <a:endParaRPr lang="en-GB"/>
           </a:p>
@@ -873,7 +873,7 @@
           <a:p>
             <a:fld id="{3BCC14AE-D617-41D5-BCF6-6DE6B30EE28B}" type="datetimeFigureOut">
               <a:rPr lang="en-GB" smtClean="0"/>
-              <a:t>14/01/2021</a:t>
+              <a:t>16/01/2021</a:t>
             </a:fld>
             <a:endParaRPr lang="en-GB"/>
           </a:p>
@@ -1149,7 +1149,7 @@
           <a:p>
             <a:fld id="{3BCC14AE-D617-41D5-BCF6-6DE6B30EE28B}" type="datetimeFigureOut">
               <a:rPr lang="en-GB" smtClean="0"/>
-              <a:t>14/01/2021</a:t>
+              <a:t>16/01/2021</a:t>
             </a:fld>
             <a:endParaRPr lang="en-GB"/>
           </a:p>
@@ -1417,7 +1417,7 @@
           <a:p>
             <a:fld id="{3BCC14AE-D617-41D5-BCF6-6DE6B30EE28B}" type="datetimeFigureOut">
               <a:rPr lang="en-GB" smtClean="0"/>
-              <a:t>14/01/2021</a:t>
+              <a:t>16/01/2021</a:t>
             </a:fld>
             <a:endParaRPr lang="en-GB"/>
           </a:p>
@@ -1832,7 +1832,7 @@
           <a:p>
             <a:fld id="{3BCC14AE-D617-41D5-BCF6-6DE6B30EE28B}" type="datetimeFigureOut">
               <a:rPr lang="en-GB" smtClean="0"/>
-              <a:t>14/01/2021</a:t>
+              <a:t>16/01/2021</a:t>
             </a:fld>
             <a:endParaRPr lang="en-GB"/>
           </a:p>
@@ -1974,7 +1974,7 @@
           <a:p>
             <a:fld id="{3BCC14AE-D617-41D5-BCF6-6DE6B30EE28B}" type="datetimeFigureOut">
               <a:rPr lang="en-GB" smtClean="0"/>
-              <a:t>14/01/2021</a:t>
+              <a:t>16/01/2021</a:t>
             </a:fld>
             <a:endParaRPr lang="en-GB"/>
           </a:p>
@@ -2087,7 +2087,7 @@
           <a:p>
             <a:fld id="{3BCC14AE-D617-41D5-BCF6-6DE6B30EE28B}" type="datetimeFigureOut">
               <a:rPr lang="en-GB" smtClean="0"/>
-              <a:t>14/01/2021</a:t>
+              <a:t>16/01/2021</a:t>
             </a:fld>
             <a:endParaRPr lang="en-GB"/>
           </a:p>
@@ -2400,7 +2400,7 @@
           <a:p>
             <a:fld id="{3BCC14AE-D617-41D5-BCF6-6DE6B30EE28B}" type="datetimeFigureOut">
               <a:rPr lang="en-GB" smtClean="0"/>
-              <a:t>14/01/2021</a:t>
+              <a:t>16/01/2021</a:t>
             </a:fld>
             <a:endParaRPr lang="en-GB"/>
           </a:p>
@@ -2689,7 +2689,7 @@
           <a:p>
             <a:fld id="{3BCC14AE-D617-41D5-BCF6-6DE6B30EE28B}" type="datetimeFigureOut">
               <a:rPr lang="en-GB" smtClean="0"/>
-              <a:t>14/01/2021</a:t>
+              <a:t>16/01/2021</a:t>
             </a:fld>
             <a:endParaRPr lang="en-GB"/>
           </a:p>
@@ -2932,7 +2932,7 @@
           <a:p>
             <a:fld id="{3BCC14AE-D617-41D5-BCF6-6DE6B30EE28B}" type="datetimeFigureOut">
               <a:rPr lang="en-GB" smtClean="0"/>
-              <a:t>14/01/2021</a:t>
+              <a:t>16/01/2021</a:t>
             </a:fld>
             <a:endParaRPr lang="en-GB"/>
           </a:p>
@@ -3349,6 +3349,386 @@
           <a:chExt cx="0" cy="0"/>
         </a:xfrm>
       </p:grpSpPr>
+      <p:sp>
+        <p:nvSpPr>
+          <p:cNvPr id="6" name="Cloud 5">
+            <a:extLst>
+              <a:ext uri="{FF2B5EF4-FFF2-40B4-BE49-F238E27FC236}">
+                <a16:creationId xmlns:a16="http://schemas.microsoft.com/office/drawing/2014/main" id="{1BDF2AC8-AB8D-4F7D-B531-4404B67F5038}"/>
+              </a:ext>
+            </a:extLst>
+          </p:cNvPr>
+          <p:cNvSpPr/>
+          <p:nvPr/>
+        </p:nvSpPr>
+        <p:spPr>
+          <a:xfrm>
+            <a:off x="656839" y="2035994"/>
+            <a:ext cx="3093720" cy="2487930"/>
+          </a:xfrm>
+          <a:prstGeom prst="cloud">
+            <a:avLst/>
+          </a:prstGeom>
+          <a:solidFill>
+            <a:srgbClr val="009242"/>
+          </a:solidFill>
+          <a:ln>
+            <a:noFill/>
+          </a:ln>
+        </p:spPr>
+        <p:style>
+          <a:lnRef idx="2">
+            <a:schemeClr val="accent1">
+              <a:shade val="50000"/>
+            </a:schemeClr>
+          </a:lnRef>
+          <a:fillRef idx="1">
+            <a:schemeClr val="accent1"/>
+          </a:fillRef>
+          <a:effectRef idx="0">
+            <a:schemeClr val="accent1"/>
+          </a:effectRef>
+          <a:fontRef idx="minor">
+            <a:schemeClr val="lt1"/>
+          </a:fontRef>
+        </p:style>
+        <p:txBody>
+          <a:bodyPr rtlCol="0" anchor="ctr"/>
+          <a:lstStyle/>
+          <a:p>
+            <a:pPr algn="ctr"/>
+            <a:endParaRPr lang="en-GB"/>
+          </a:p>
+        </p:txBody>
+      </p:sp>
+      <p:sp>
+        <p:nvSpPr>
+          <p:cNvPr id="7" name="Star: 7 Points 6">
+            <a:extLst>
+              <a:ext uri="{FF2B5EF4-FFF2-40B4-BE49-F238E27FC236}">
+                <a16:creationId xmlns:a16="http://schemas.microsoft.com/office/drawing/2014/main" id="{6DD4FEFD-CEE4-42E1-B502-731EE6EFE62E}"/>
+              </a:ext>
+            </a:extLst>
+          </p:cNvPr>
+          <p:cNvSpPr/>
+          <p:nvPr/>
+        </p:nvSpPr>
+        <p:spPr>
+          <a:xfrm>
+            <a:off x="972837" y="2035994"/>
+            <a:ext cx="2668435" cy="2420664"/>
+          </a:xfrm>
+          <a:prstGeom prst="star7">
+            <a:avLst>
+              <a:gd name="adj" fmla="val 38686"/>
+              <a:gd name="hf" fmla="val 102572"/>
+              <a:gd name="vf" fmla="val 105210"/>
+            </a:avLst>
+          </a:prstGeom>
+          <a:solidFill>
+            <a:srgbClr val="007E39"/>
+          </a:solidFill>
+          <a:ln>
+            <a:noFill/>
+          </a:ln>
+        </p:spPr>
+        <p:style>
+          <a:lnRef idx="2">
+            <a:schemeClr val="accent1">
+              <a:shade val="50000"/>
+            </a:schemeClr>
+          </a:lnRef>
+          <a:fillRef idx="1">
+            <a:schemeClr val="accent1"/>
+          </a:fillRef>
+          <a:effectRef idx="0">
+            <a:schemeClr val="accent1"/>
+          </a:effectRef>
+          <a:fontRef idx="minor">
+            <a:schemeClr val="lt1"/>
+          </a:fontRef>
+        </p:style>
+        <p:txBody>
+          <a:bodyPr rtlCol="0" anchor="ctr"/>
+          <a:lstStyle/>
+          <a:p>
+            <a:pPr algn="ctr"/>
+            <a:endParaRPr lang="en-GB"/>
+          </a:p>
+        </p:txBody>
+      </p:sp>
+      <p:sp>
+        <p:nvSpPr>
+          <p:cNvPr id="5" name="Star: 7 Points 4">
+            <a:extLst>
+              <a:ext uri="{FF2B5EF4-FFF2-40B4-BE49-F238E27FC236}">
+                <a16:creationId xmlns:a16="http://schemas.microsoft.com/office/drawing/2014/main" id="{883A7932-06E5-4801-B4E5-5277E4B3AC82}"/>
+              </a:ext>
+            </a:extLst>
+          </p:cNvPr>
+          <p:cNvSpPr/>
+          <p:nvPr/>
+        </p:nvSpPr>
+        <p:spPr>
+          <a:xfrm>
+            <a:off x="1232149" y="2266950"/>
+            <a:ext cx="1943100" cy="1704975"/>
+          </a:xfrm>
+          <a:prstGeom prst="star7">
+            <a:avLst>
+              <a:gd name="adj" fmla="val 38686"/>
+              <a:gd name="hf" fmla="val 102572"/>
+              <a:gd name="vf" fmla="val 105210"/>
+            </a:avLst>
+          </a:prstGeom>
+          <a:solidFill>
+            <a:srgbClr val="006C31"/>
+          </a:solidFill>
+          <a:ln>
+            <a:noFill/>
+          </a:ln>
+        </p:spPr>
+        <p:style>
+          <a:lnRef idx="2">
+            <a:schemeClr val="accent1">
+              <a:shade val="50000"/>
+            </a:schemeClr>
+          </a:lnRef>
+          <a:fillRef idx="1">
+            <a:schemeClr val="accent1"/>
+          </a:fillRef>
+          <a:effectRef idx="0">
+            <a:schemeClr val="accent1"/>
+          </a:effectRef>
+          <a:fontRef idx="minor">
+            <a:schemeClr val="lt1"/>
+          </a:fontRef>
+        </p:style>
+        <p:txBody>
+          <a:bodyPr rtlCol="0" anchor="ctr"/>
+          <a:lstStyle/>
+          <a:p>
+            <a:pPr algn="ctr"/>
+            <a:endParaRPr lang="en-GB"/>
+          </a:p>
+        </p:txBody>
+      </p:sp>
+      <p:sp>
+        <p:nvSpPr>
+          <p:cNvPr id="4" name="Hexagon 3">
+            <a:extLst>
+              <a:ext uri="{FF2B5EF4-FFF2-40B4-BE49-F238E27FC236}">
+                <a16:creationId xmlns:a16="http://schemas.microsoft.com/office/drawing/2014/main" id="{77872B03-221F-409C-9026-EBC33C465114}"/>
+              </a:ext>
+            </a:extLst>
+          </p:cNvPr>
+          <p:cNvSpPr/>
+          <p:nvPr/>
+        </p:nvSpPr>
+        <p:spPr>
+          <a:xfrm>
+            <a:off x="1943349" y="2984761"/>
+            <a:ext cx="520700" cy="419100"/>
+          </a:xfrm>
+          <a:prstGeom prst="hexagon">
+            <a:avLst/>
+          </a:prstGeom>
+          <a:solidFill>
+            <a:schemeClr val="accent4">
+              <a:lumMod val="50000"/>
+            </a:schemeClr>
+          </a:solidFill>
+          <a:ln>
+            <a:noFill/>
+          </a:ln>
+        </p:spPr>
+        <p:style>
+          <a:lnRef idx="2">
+            <a:schemeClr val="accent1">
+              <a:shade val="50000"/>
+            </a:schemeClr>
+          </a:lnRef>
+          <a:fillRef idx="1">
+            <a:schemeClr val="accent1"/>
+          </a:fillRef>
+          <a:effectRef idx="0">
+            <a:schemeClr val="accent1"/>
+          </a:effectRef>
+          <a:fontRef idx="minor">
+            <a:schemeClr val="lt1"/>
+          </a:fontRef>
+        </p:style>
+        <p:txBody>
+          <a:bodyPr rtlCol="0" anchor="ctr"/>
+          <a:lstStyle/>
+          <a:p>
+            <a:pPr algn="ctr"/>
+            <a:endParaRPr lang="en-GB"/>
+          </a:p>
+        </p:txBody>
+      </p:sp>
+      <p:sp>
+        <p:nvSpPr>
+          <p:cNvPr id="8" name="Cloud 7">
+            <a:extLst>
+              <a:ext uri="{FF2B5EF4-FFF2-40B4-BE49-F238E27FC236}">
+                <a16:creationId xmlns:a16="http://schemas.microsoft.com/office/drawing/2014/main" id="{C42CC265-1C7F-4954-907D-1E203B2FCD1F}"/>
+              </a:ext>
+            </a:extLst>
+          </p:cNvPr>
+          <p:cNvSpPr/>
+          <p:nvPr/>
+        </p:nvSpPr>
+        <p:spPr>
+          <a:xfrm>
+            <a:off x="6248400" y="2209800"/>
+            <a:ext cx="3594100" cy="2819400"/>
+          </a:xfrm>
+          <a:prstGeom prst="cloud">
+            <a:avLst/>
+          </a:prstGeom>
+          <a:solidFill>
+            <a:srgbClr val="009644"/>
+          </a:solidFill>
+          <a:ln w="254000">
+            <a:solidFill>
+              <a:srgbClr val="006C31"/>
+            </a:solidFill>
+          </a:ln>
+        </p:spPr>
+        <p:style>
+          <a:lnRef idx="2">
+            <a:schemeClr val="accent1">
+              <a:shade val="50000"/>
+            </a:schemeClr>
+          </a:lnRef>
+          <a:fillRef idx="1">
+            <a:schemeClr val="accent1"/>
+          </a:fillRef>
+          <a:effectRef idx="0">
+            <a:schemeClr val="accent1"/>
+          </a:effectRef>
+          <a:fontRef idx="minor">
+            <a:schemeClr val="lt1"/>
+          </a:fontRef>
+        </p:style>
+        <p:txBody>
+          <a:bodyPr rtlCol="0" anchor="ctr"/>
+          <a:lstStyle/>
+          <a:p>
+            <a:pPr algn="ctr"/>
+            <a:endParaRPr lang="en-GB"/>
+          </a:p>
+        </p:txBody>
+      </p:sp>
+      <p:sp>
+        <p:nvSpPr>
+          <p:cNvPr id="10" name="Cloud 9">
+            <a:extLst>
+              <a:ext uri="{FF2B5EF4-FFF2-40B4-BE49-F238E27FC236}">
+                <a16:creationId xmlns:a16="http://schemas.microsoft.com/office/drawing/2014/main" id="{4C903C0B-EB2B-454F-A5FC-26894E380091}"/>
+              </a:ext>
+            </a:extLst>
+          </p:cNvPr>
+          <p:cNvSpPr/>
+          <p:nvPr/>
+        </p:nvSpPr>
+        <p:spPr>
+          <a:xfrm>
+            <a:off x="7048500" y="2690812"/>
+            <a:ext cx="2095500" cy="1765846"/>
+          </a:xfrm>
+          <a:prstGeom prst="cloud">
+            <a:avLst/>
+          </a:prstGeom>
+          <a:solidFill>
+            <a:srgbClr val="007E39"/>
+          </a:solidFill>
+          <a:ln w="127000">
+            <a:solidFill>
+              <a:srgbClr val="006C31"/>
+            </a:solidFill>
+          </a:ln>
+        </p:spPr>
+        <p:style>
+          <a:lnRef idx="2">
+            <a:schemeClr val="accent1">
+              <a:shade val="50000"/>
+            </a:schemeClr>
+          </a:lnRef>
+          <a:fillRef idx="1">
+            <a:schemeClr val="accent1"/>
+          </a:fillRef>
+          <a:effectRef idx="0">
+            <a:schemeClr val="accent1"/>
+          </a:effectRef>
+          <a:fontRef idx="minor">
+            <a:schemeClr val="lt1"/>
+          </a:fontRef>
+        </p:style>
+        <p:txBody>
+          <a:bodyPr rtlCol="0" anchor="ctr"/>
+          <a:lstStyle/>
+          <a:p>
+            <a:pPr algn="ctr"/>
+            <a:endParaRPr lang="en-GB"/>
+          </a:p>
+        </p:txBody>
+      </p:sp>
+      <p:sp>
+        <p:nvSpPr>
+          <p:cNvPr id="9" name="Cloud 8">
+            <a:extLst>
+              <a:ext uri="{FF2B5EF4-FFF2-40B4-BE49-F238E27FC236}">
+                <a16:creationId xmlns:a16="http://schemas.microsoft.com/office/drawing/2014/main" id="{D069D26F-D1C7-4D10-BB91-1043E2184AAD}"/>
+              </a:ext>
+            </a:extLst>
+          </p:cNvPr>
+          <p:cNvSpPr/>
+          <p:nvPr/>
+        </p:nvSpPr>
+        <p:spPr>
+          <a:xfrm>
+            <a:off x="7569200" y="3151448"/>
+            <a:ext cx="1079500" cy="782377"/>
+          </a:xfrm>
+          <a:prstGeom prst="cloud">
+            <a:avLst/>
+          </a:prstGeom>
+          <a:solidFill>
+            <a:srgbClr val="007E39"/>
+          </a:solidFill>
+          <a:ln w="127000">
+            <a:solidFill>
+              <a:srgbClr val="006C31"/>
+            </a:solidFill>
+          </a:ln>
+        </p:spPr>
+        <p:style>
+          <a:lnRef idx="2">
+            <a:schemeClr val="accent1">
+              <a:shade val="50000"/>
+            </a:schemeClr>
+          </a:lnRef>
+          <a:fillRef idx="1">
+            <a:schemeClr val="accent1"/>
+          </a:fillRef>
+          <a:effectRef idx="0">
+            <a:schemeClr val="accent1"/>
+          </a:effectRef>
+          <a:fontRef idx="minor">
+            <a:schemeClr val="lt1"/>
+          </a:fontRef>
+        </p:style>
+        <p:txBody>
+          <a:bodyPr rtlCol="0" anchor="ctr"/>
+          <a:lstStyle/>
+          <a:p>
+            <a:pPr algn="ctr"/>
+            <a:endParaRPr lang="en-GB"/>
+          </a:p>
+        </p:txBody>
+      </p:sp>
     </p:spTree>
     <p:extLst>
       <p:ext uri="{BB962C8B-B14F-4D97-AF65-F5344CB8AC3E}">

</xml_diff>

<commit_message>
SPIKEY TREE: Added alternate graphic.
</commit_message>
<xml_diff>
--- a/src/uk/dangrew/dinosaurs/resources/image-construction.pptx
+++ b/src/uk/dangrew/dinosaurs/resources/image-construction.pptx
@@ -3363,7 +3363,7 @@
         </p:nvSpPr>
         <p:spPr>
           <a:xfrm>
-            <a:off x="656839" y="2035994"/>
+            <a:off x="656839" y="226244"/>
             <a:ext cx="3093720" cy="2487930"/>
           </a:xfrm>
           <a:prstGeom prst="cloud">
@@ -3415,7 +3415,7 @@
         </p:nvSpPr>
         <p:spPr>
           <a:xfrm>
-            <a:off x="972837" y="2035994"/>
+            <a:off x="972837" y="226244"/>
             <a:ext cx="2668435" cy="2420664"/>
           </a:xfrm>
           <a:prstGeom prst="star7">
@@ -3471,7 +3471,7 @@
         </p:nvSpPr>
         <p:spPr>
           <a:xfrm>
-            <a:off x="1232149" y="2266950"/>
+            <a:off x="1232149" y="457200"/>
             <a:ext cx="1943100" cy="1704975"/>
           </a:xfrm>
           <a:prstGeom prst="star7">
@@ -3527,7 +3527,7 @@
         </p:nvSpPr>
         <p:spPr>
           <a:xfrm>
-            <a:off x="1943349" y="2984761"/>
+            <a:off x="1943349" y="1175011"/>
             <a:ext cx="520700" cy="419100"/>
           </a:xfrm>
           <a:prstGeom prst="hexagon">
@@ -3581,7 +3581,7 @@
         </p:nvSpPr>
         <p:spPr>
           <a:xfrm>
-            <a:off x="6248400" y="2209800"/>
+            <a:off x="742950" y="3333750"/>
             <a:ext cx="3594100" cy="2819400"/>
           </a:xfrm>
           <a:prstGeom prst="cloud">
@@ -3635,7 +3635,7 @@
         </p:nvSpPr>
         <p:spPr>
           <a:xfrm>
-            <a:off x="7048500" y="2690812"/>
+            <a:off x="1543050" y="3814762"/>
             <a:ext cx="2095500" cy="1765846"/>
           </a:xfrm>
           <a:prstGeom prst="cloud">
@@ -3689,10 +3689,172 @@
         </p:nvSpPr>
         <p:spPr>
           <a:xfrm>
-            <a:off x="7569200" y="3151448"/>
+            <a:off x="2063750" y="4275398"/>
             <a:ext cx="1079500" cy="782377"/>
           </a:xfrm>
           <a:prstGeom prst="cloud">
+            <a:avLst/>
+          </a:prstGeom>
+          <a:solidFill>
+            <a:srgbClr val="007E39"/>
+          </a:solidFill>
+          <a:ln w="127000">
+            <a:solidFill>
+              <a:srgbClr val="006C31"/>
+            </a:solidFill>
+          </a:ln>
+        </p:spPr>
+        <p:style>
+          <a:lnRef idx="2">
+            <a:schemeClr val="accent1">
+              <a:shade val="50000"/>
+            </a:schemeClr>
+          </a:lnRef>
+          <a:fillRef idx="1">
+            <a:schemeClr val="accent1"/>
+          </a:fillRef>
+          <a:effectRef idx="0">
+            <a:schemeClr val="accent1"/>
+          </a:effectRef>
+          <a:fontRef idx="minor">
+            <a:schemeClr val="lt1"/>
+          </a:fontRef>
+        </p:style>
+        <p:txBody>
+          <a:bodyPr rtlCol="0" anchor="ctr"/>
+          <a:lstStyle/>
+          <a:p>
+            <a:pPr algn="ctr"/>
+            <a:endParaRPr lang="en-GB"/>
+          </a:p>
+        </p:txBody>
+      </p:sp>
+      <p:sp>
+        <p:nvSpPr>
+          <p:cNvPr id="11" name="Star: 7 Points 10">
+            <a:extLst>
+              <a:ext uri="{FF2B5EF4-FFF2-40B4-BE49-F238E27FC236}">
+                <a16:creationId xmlns:a16="http://schemas.microsoft.com/office/drawing/2014/main" id="{DAE39633-DB62-41F6-B070-F1A60F421FE0}"/>
+              </a:ext>
+            </a:extLst>
+          </p:cNvPr>
+          <p:cNvSpPr/>
+          <p:nvPr/>
+        </p:nvSpPr>
+        <p:spPr>
+          <a:xfrm>
+            <a:off x="6057902" y="1304474"/>
+            <a:ext cx="3594100" cy="2819400"/>
+          </a:xfrm>
+          <a:prstGeom prst="star7">
+            <a:avLst/>
+          </a:prstGeom>
+          <a:solidFill>
+            <a:srgbClr val="009644"/>
+          </a:solidFill>
+          <a:ln w="254000">
+            <a:solidFill>
+              <a:srgbClr val="006C31"/>
+            </a:solidFill>
+          </a:ln>
+        </p:spPr>
+        <p:style>
+          <a:lnRef idx="2">
+            <a:schemeClr val="accent1">
+              <a:shade val="50000"/>
+            </a:schemeClr>
+          </a:lnRef>
+          <a:fillRef idx="1">
+            <a:schemeClr val="accent1"/>
+          </a:fillRef>
+          <a:effectRef idx="0">
+            <a:schemeClr val="accent1"/>
+          </a:effectRef>
+          <a:fontRef idx="minor">
+            <a:schemeClr val="lt1"/>
+          </a:fontRef>
+        </p:style>
+        <p:txBody>
+          <a:bodyPr rtlCol="0" anchor="ctr"/>
+          <a:lstStyle/>
+          <a:p>
+            <a:pPr algn="ctr"/>
+            <a:endParaRPr lang="en-GB"/>
+          </a:p>
+        </p:txBody>
+      </p:sp>
+      <p:sp>
+        <p:nvSpPr>
+          <p:cNvPr id="12" name="Star: 7 Points 11">
+            <a:extLst>
+              <a:ext uri="{FF2B5EF4-FFF2-40B4-BE49-F238E27FC236}">
+                <a16:creationId xmlns:a16="http://schemas.microsoft.com/office/drawing/2014/main" id="{6A4515E3-507A-4EF8-8D8F-A9DD3D87F4CF}"/>
+              </a:ext>
+            </a:extLst>
+          </p:cNvPr>
+          <p:cNvSpPr/>
+          <p:nvPr/>
+        </p:nvSpPr>
+        <p:spPr>
+          <a:xfrm>
+            <a:off x="6858002" y="1785486"/>
+            <a:ext cx="2095500" cy="1765846"/>
+          </a:xfrm>
+          <a:prstGeom prst="star7">
+            <a:avLst/>
+          </a:prstGeom>
+          <a:solidFill>
+            <a:srgbClr val="007E39"/>
+          </a:solidFill>
+          <a:ln w="127000">
+            <a:solidFill>
+              <a:srgbClr val="006C31"/>
+            </a:solidFill>
+          </a:ln>
+        </p:spPr>
+        <p:style>
+          <a:lnRef idx="2">
+            <a:schemeClr val="accent1">
+              <a:shade val="50000"/>
+            </a:schemeClr>
+          </a:lnRef>
+          <a:fillRef idx="1">
+            <a:schemeClr val="accent1"/>
+          </a:fillRef>
+          <a:effectRef idx="0">
+            <a:schemeClr val="accent1"/>
+          </a:effectRef>
+          <a:fontRef idx="minor">
+            <a:schemeClr val="lt1"/>
+          </a:fontRef>
+        </p:style>
+        <p:txBody>
+          <a:bodyPr rtlCol="0" anchor="ctr"/>
+          <a:lstStyle/>
+          <a:p>
+            <a:pPr algn="ctr"/>
+            <a:endParaRPr lang="en-GB"/>
+          </a:p>
+        </p:txBody>
+      </p:sp>
+      <p:sp>
+        <p:nvSpPr>
+          <p:cNvPr id="13" name="Star: 7 Points 12">
+            <a:extLst>
+              <a:ext uri="{FF2B5EF4-FFF2-40B4-BE49-F238E27FC236}">
+                <a16:creationId xmlns:a16="http://schemas.microsoft.com/office/drawing/2014/main" id="{66BDC168-0CF4-4729-A30E-4760F4031D54}"/>
+              </a:ext>
+            </a:extLst>
+          </p:cNvPr>
+          <p:cNvSpPr/>
+          <p:nvPr/>
+        </p:nvSpPr>
+        <p:spPr>
+          <a:xfrm>
+            <a:off x="7378702" y="2246122"/>
+            <a:ext cx="1079500" cy="782377"/>
+          </a:xfrm>
+          <a:prstGeom prst="star7">
             <a:avLst/>
           </a:prstGeom>
           <a:solidFill>

</xml_diff>

<commit_message>
ROCKS: Added basic rocks, with graphics. No collision detection yet.
</commit_message>
<xml_diff>
--- a/src/uk/dangrew/dinosaurs/resources/image-construction.pptx
+++ b/src/uk/dangrew/dinosaurs/resources/image-construction.pptx
@@ -5,9 +5,11 @@
     <p:sldMasterId id="2147483648" r:id="rId1"/>
   </p:sldMasterIdLst>
   <p:sldIdLst>
-    <p:sldId id="257" r:id="rId2"/>
-    <p:sldId id="258" r:id="rId3"/>
-    <p:sldId id="256" r:id="rId4"/>
+    <p:sldId id="259" r:id="rId2"/>
+    <p:sldId id="260" r:id="rId3"/>
+    <p:sldId id="257" r:id="rId4"/>
+    <p:sldId id="258" r:id="rId5"/>
+    <p:sldId id="256" r:id="rId6"/>
   </p:sldIdLst>
   <p:sldSz cx="12192000" cy="6858000"/>
   <p:notesSz cx="6858000" cy="9144000"/>
@@ -3351,10 +3353,10 @@
       </p:grpSpPr>
       <p:sp>
         <p:nvSpPr>
-          <p:cNvPr id="6" name="Cloud 5">
-            <a:extLst>
-              <a:ext uri="{FF2B5EF4-FFF2-40B4-BE49-F238E27FC236}">
-                <a16:creationId xmlns:a16="http://schemas.microsoft.com/office/drawing/2014/main" id="{1BDF2AC8-AB8D-4F7D-B531-4404B67F5038}"/>
+          <p:cNvPr id="47" name="Rectangle 46">
+            <a:extLst>
+              <a:ext uri="{FF2B5EF4-FFF2-40B4-BE49-F238E27FC236}">
+                <a16:creationId xmlns:a16="http://schemas.microsoft.com/office/drawing/2014/main" id="{F3D5A149-B9F4-4236-9DA9-358F211A3B63}"/>
               </a:ext>
             </a:extLst>
           </p:cNvPr>
@@ -3363,14 +3365,14 @@
         </p:nvSpPr>
         <p:spPr>
           <a:xfrm>
-            <a:off x="656839" y="226244"/>
-            <a:ext cx="3093720" cy="2487930"/>
-          </a:xfrm>
-          <a:prstGeom prst="cloud">
+            <a:off x="2235780" y="2478814"/>
+            <a:ext cx="2918825" cy="1233714"/>
+          </a:xfrm>
+          <a:prstGeom prst="rect">
             <a:avLst/>
           </a:prstGeom>
           <a:solidFill>
-            <a:srgbClr val="009242"/>
+            <a:schemeClr val="tx1"/>
           </a:solidFill>
           <a:ln>
             <a:noFill/>
@@ -3403,10 +3405,10 @@
       </p:sp>
       <p:sp>
         <p:nvSpPr>
-          <p:cNvPr id="7" name="Star: 7 Points 6">
-            <a:extLst>
-              <a:ext uri="{FF2B5EF4-FFF2-40B4-BE49-F238E27FC236}">
-                <a16:creationId xmlns:a16="http://schemas.microsoft.com/office/drawing/2014/main" id="{6DD4FEFD-CEE4-42E1-B502-731EE6EFE62E}"/>
+          <p:cNvPr id="43" name="Rectangle: Rounded Corners 42">
+            <a:extLst>
+              <a:ext uri="{FF2B5EF4-FFF2-40B4-BE49-F238E27FC236}">
+                <a16:creationId xmlns:a16="http://schemas.microsoft.com/office/drawing/2014/main" id="{40B7183B-CB49-4804-97E3-63AD10705B42}"/>
               </a:ext>
             </a:extLst>
           </p:cNvPr>
@@ -3414,22 +3416,24 @@
           <p:nvPr/>
         </p:nvSpPr>
         <p:spPr>
-          <a:xfrm>
-            <a:off x="972837" y="226244"/>
-            <a:ext cx="2668435" cy="2420664"/>
-          </a:xfrm>
-          <a:prstGeom prst="star7">
-            <a:avLst>
-              <a:gd name="adj" fmla="val 38686"/>
-              <a:gd name="hf" fmla="val 102572"/>
-              <a:gd name="vf" fmla="val 105210"/>
-            </a:avLst>
+          <a:xfrm rot="5400000">
+            <a:off x="4002097" y="1983014"/>
+            <a:ext cx="2160000" cy="1080000"/>
+          </a:xfrm>
+          <a:prstGeom prst="roundRect">
+            <a:avLst/>
           </a:prstGeom>
           <a:solidFill>
-            <a:srgbClr val="007E39"/>
-          </a:solidFill>
-          <a:ln>
-            <a:noFill/>
+            <a:schemeClr val="accent4">
+              <a:lumMod val="75000"/>
+            </a:schemeClr>
+          </a:solidFill>
+          <a:ln w="254000">
+            <a:solidFill>
+              <a:schemeClr val="accent4">
+                <a:lumMod val="50000"/>
+              </a:schemeClr>
+            </a:solidFill>
           </a:ln>
         </p:spPr>
         <p:style>
@@ -3459,10 +3463,10 @@
       </p:sp>
       <p:sp>
         <p:nvSpPr>
-          <p:cNvPr id="5" name="Star: 7 Points 4">
-            <a:extLst>
-              <a:ext uri="{FF2B5EF4-FFF2-40B4-BE49-F238E27FC236}">
-                <a16:creationId xmlns:a16="http://schemas.microsoft.com/office/drawing/2014/main" id="{883A7932-06E5-4801-B4E5-5277E4B3AC82}"/>
+          <p:cNvPr id="42" name="Rectangle: Rounded Corners 41">
+            <a:extLst>
+              <a:ext uri="{FF2B5EF4-FFF2-40B4-BE49-F238E27FC236}">
+                <a16:creationId xmlns:a16="http://schemas.microsoft.com/office/drawing/2014/main" id="{12FD9CF0-C5B7-45A7-B59C-23A68B2FC9CA}"/>
               </a:ext>
             </a:extLst>
           </p:cNvPr>
@@ -3470,22 +3474,24 @@
           <p:nvPr/>
         </p:nvSpPr>
         <p:spPr>
-          <a:xfrm>
-            <a:off x="1232149" y="457200"/>
-            <a:ext cx="1943100" cy="1704975"/>
-          </a:xfrm>
-          <a:prstGeom prst="star7">
-            <a:avLst>
-              <a:gd name="adj" fmla="val 38686"/>
-              <a:gd name="hf" fmla="val 102572"/>
-              <a:gd name="vf" fmla="val 105210"/>
-            </a:avLst>
+          <a:xfrm rot="16200000">
+            <a:off x="1182771" y="1984986"/>
+            <a:ext cx="2160000" cy="1080000"/>
+          </a:xfrm>
+          <a:prstGeom prst="roundRect">
+            <a:avLst/>
           </a:prstGeom>
           <a:solidFill>
-            <a:srgbClr val="006C31"/>
-          </a:solidFill>
-          <a:ln>
-            <a:noFill/>
+            <a:schemeClr val="accent4">
+              <a:lumMod val="75000"/>
+            </a:schemeClr>
+          </a:solidFill>
+          <a:ln w="254000">
+            <a:solidFill>
+              <a:schemeClr val="accent4">
+                <a:lumMod val="50000"/>
+              </a:schemeClr>
+            </a:solidFill>
           </a:ln>
         </p:spPr>
         <p:style>
@@ -3515,10 +3521,10 @@
       </p:sp>
       <p:sp>
         <p:nvSpPr>
-          <p:cNvPr id="4" name="Hexagon 3">
-            <a:extLst>
-              <a:ext uri="{FF2B5EF4-FFF2-40B4-BE49-F238E27FC236}">
-                <a16:creationId xmlns:a16="http://schemas.microsoft.com/office/drawing/2014/main" id="{77872B03-221F-409C-9026-EBC33C465114}"/>
+          <p:cNvPr id="38" name="Rectangle: Rounded Corners 37">
+            <a:extLst>
+              <a:ext uri="{FF2B5EF4-FFF2-40B4-BE49-F238E27FC236}">
+                <a16:creationId xmlns:a16="http://schemas.microsoft.com/office/drawing/2014/main" id="{B23D5DFB-B735-491D-8F76-C2A6226FC21A}"/>
               </a:ext>
             </a:extLst>
           </p:cNvPr>
@@ -3526,20 +3532,24 @@
           <p:nvPr/>
         </p:nvSpPr>
         <p:spPr>
-          <a:xfrm>
-            <a:off x="1943349" y="1175011"/>
-            <a:ext cx="520700" cy="419100"/>
-          </a:xfrm>
-          <a:prstGeom prst="hexagon">
+          <a:xfrm rot="5400000">
+            <a:off x="-75450" y="1974600"/>
+            <a:ext cx="2160000" cy="1080000"/>
+          </a:xfrm>
+          <a:prstGeom prst="roundRect">
             <a:avLst/>
           </a:prstGeom>
           <a:solidFill>
             <a:schemeClr val="accent4">
-              <a:lumMod val="50000"/>
-            </a:schemeClr>
-          </a:solidFill>
-          <a:ln>
-            <a:noFill/>
+              <a:lumMod val="75000"/>
+            </a:schemeClr>
+          </a:solidFill>
+          <a:ln w="254000">
+            <a:solidFill>
+              <a:schemeClr val="accent4">
+                <a:lumMod val="50000"/>
+              </a:schemeClr>
+            </a:solidFill>
           </a:ln>
         </p:spPr>
         <p:style>
@@ -3569,10 +3579,10 @@
       </p:sp>
       <p:sp>
         <p:nvSpPr>
-          <p:cNvPr id="8" name="Cloud 7">
-            <a:extLst>
-              <a:ext uri="{FF2B5EF4-FFF2-40B4-BE49-F238E27FC236}">
-                <a16:creationId xmlns:a16="http://schemas.microsoft.com/office/drawing/2014/main" id="{C42CC265-1C7F-4954-907D-1E203B2FCD1F}"/>
+          <p:cNvPr id="39" name="Rectangle: Rounded Corners 38">
+            <a:extLst>
+              <a:ext uri="{FF2B5EF4-FFF2-40B4-BE49-F238E27FC236}">
+                <a16:creationId xmlns:a16="http://schemas.microsoft.com/office/drawing/2014/main" id="{00FE3672-773D-4879-A3B7-87924B848F24}"/>
               </a:ext>
             </a:extLst>
           </p:cNvPr>
@@ -3580,19 +3590,23 @@
           <p:nvPr/>
         </p:nvSpPr>
         <p:spPr>
-          <a:xfrm>
-            <a:off x="742950" y="3333750"/>
-            <a:ext cx="3594100" cy="2819400"/>
-          </a:xfrm>
-          <a:prstGeom prst="cloud">
+          <a:xfrm rot="5400000">
+            <a:off x="5303000" y="1968500"/>
+            <a:ext cx="2160000" cy="1080000"/>
+          </a:xfrm>
+          <a:prstGeom prst="roundRect">
             <a:avLst/>
           </a:prstGeom>
           <a:solidFill>
-            <a:srgbClr val="009644"/>
+            <a:schemeClr val="accent4">
+              <a:lumMod val="75000"/>
+            </a:schemeClr>
           </a:solidFill>
           <a:ln w="254000">
             <a:solidFill>
-              <a:srgbClr val="006C31"/>
+              <a:schemeClr val="accent4">
+                <a:lumMod val="50000"/>
+              </a:schemeClr>
             </a:solidFill>
           </a:ln>
         </p:spPr>
@@ -3623,10 +3637,10 @@
       </p:sp>
       <p:sp>
         <p:nvSpPr>
-          <p:cNvPr id="10" name="Cloud 9">
-            <a:extLst>
-              <a:ext uri="{FF2B5EF4-FFF2-40B4-BE49-F238E27FC236}">
-                <a16:creationId xmlns:a16="http://schemas.microsoft.com/office/drawing/2014/main" id="{4C903C0B-EB2B-454F-A5FC-26894E380091}"/>
+          <p:cNvPr id="40" name="Rectangle: Rounded Corners 39">
+            <a:extLst>
+              <a:ext uri="{FF2B5EF4-FFF2-40B4-BE49-F238E27FC236}">
+                <a16:creationId xmlns:a16="http://schemas.microsoft.com/office/drawing/2014/main" id="{74CF64F2-1747-487C-A7A5-B934D1CF7C3C}"/>
               </a:ext>
             </a:extLst>
           </p:cNvPr>
@@ -3635,18 +3649,22 @@
         </p:nvSpPr>
         <p:spPr>
           <a:xfrm>
-            <a:off x="1543050" y="3814762"/>
-            <a:ext cx="2095500" cy="1765846"/>
-          </a:xfrm>
-          <a:prstGeom prst="cloud">
+            <a:off x="1536700" y="1409700"/>
+            <a:ext cx="2160000" cy="1080000"/>
+          </a:xfrm>
+          <a:prstGeom prst="roundRect">
             <a:avLst/>
           </a:prstGeom>
           <a:solidFill>
-            <a:srgbClr val="007E39"/>
-          </a:solidFill>
-          <a:ln w="127000">
+            <a:schemeClr val="accent4">
+              <a:lumMod val="75000"/>
+            </a:schemeClr>
+          </a:solidFill>
+          <a:ln w="254000">
             <a:solidFill>
-              <a:srgbClr val="006C31"/>
+              <a:schemeClr val="accent4">
+                <a:lumMod val="50000"/>
+              </a:schemeClr>
             </a:solidFill>
           </a:ln>
         </p:spPr>
@@ -3677,10 +3695,10 @@
       </p:sp>
       <p:sp>
         <p:nvSpPr>
-          <p:cNvPr id="9" name="Cloud 8">
-            <a:extLst>
-              <a:ext uri="{FF2B5EF4-FFF2-40B4-BE49-F238E27FC236}">
-                <a16:creationId xmlns:a16="http://schemas.microsoft.com/office/drawing/2014/main" id="{D069D26F-D1C7-4D10-BB91-1043E2184AAD}"/>
+          <p:cNvPr id="41" name="Rectangle: Rounded Corners 40">
+            <a:extLst>
+              <a:ext uri="{FF2B5EF4-FFF2-40B4-BE49-F238E27FC236}">
+                <a16:creationId xmlns:a16="http://schemas.microsoft.com/office/drawing/2014/main" id="{E29159B8-852B-41EB-99C9-888F7B9E14DA}"/>
               </a:ext>
             </a:extLst>
           </p:cNvPr>
@@ -3689,18 +3707,22 @@
         </p:nvSpPr>
         <p:spPr>
           <a:xfrm>
-            <a:off x="2063750" y="4275398"/>
-            <a:ext cx="1079500" cy="782377"/>
-          </a:xfrm>
-          <a:prstGeom prst="cloud">
+            <a:off x="3683000" y="1409700"/>
+            <a:ext cx="2160000" cy="1080000"/>
+          </a:xfrm>
+          <a:prstGeom prst="roundRect">
             <a:avLst/>
           </a:prstGeom>
           <a:solidFill>
-            <a:srgbClr val="007E39"/>
-          </a:solidFill>
-          <a:ln w="127000">
+            <a:schemeClr val="accent4">
+              <a:lumMod val="75000"/>
+            </a:schemeClr>
+          </a:solidFill>
+          <a:ln w="254000">
             <a:solidFill>
-              <a:srgbClr val="006C31"/>
+              <a:schemeClr val="accent4">
+                <a:lumMod val="50000"/>
+              </a:schemeClr>
             </a:solidFill>
           </a:ln>
         </p:spPr>
@@ -3731,10 +3753,10 @@
       </p:sp>
       <p:sp>
         <p:nvSpPr>
-          <p:cNvPr id="11" name="Star: 7 Points 10">
-            <a:extLst>
-              <a:ext uri="{FF2B5EF4-FFF2-40B4-BE49-F238E27FC236}">
-                <a16:creationId xmlns:a16="http://schemas.microsoft.com/office/drawing/2014/main" id="{DAE39633-DB62-41F6-B070-F1A60F421FE0}"/>
+          <p:cNvPr id="44" name="Rectangle: Rounded Corners 43">
+            <a:extLst>
+              <a:ext uri="{FF2B5EF4-FFF2-40B4-BE49-F238E27FC236}">
+                <a16:creationId xmlns:a16="http://schemas.microsoft.com/office/drawing/2014/main" id="{D88B0598-8B4E-4828-89FF-A8D586FB383F}"/>
               </a:ext>
             </a:extLst>
           </p:cNvPr>
@@ -3743,18 +3765,22 @@
         </p:nvSpPr>
         <p:spPr>
           <a:xfrm>
-            <a:off x="6057902" y="1304474"/>
-            <a:ext cx="3594100" cy="2819400"/>
-          </a:xfrm>
-          <a:prstGeom prst="star7">
+            <a:off x="2609850" y="1968500"/>
+            <a:ext cx="2160000" cy="1080000"/>
+          </a:xfrm>
+          <a:prstGeom prst="roundRect">
             <a:avLst/>
           </a:prstGeom>
           <a:solidFill>
-            <a:srgbClr val="009644"/>
+            <a:schemeClr val="accent4">
+              <a:lumMod val="75000"/>
+            </a:schemeClr>
           </a:solidFill>
           <a:ln w="254000">
             <a:solidFill>
-              <a:srgbClr val="006C31"/>
+              <a:schemeClr val="accent4">
+                <a:lumMod val="50000"/>
+              </a:schemeClr>
             </a:solidFill>
           </a:ln>
         </p:spPr>
@@ -3785,10 +3811,10 @@
       </p:sp>
       <p:sp>
         <p:nvSpPr>
-          <p:cNvPr id="12" name="Star: 7 Points 11">
-            <a:extLst>
-              <a:ext uri="{FF2B5EF4-FFF2-40B4-BE49-F238E27FC236}">
-                <a16:creationId xmlns:a16="http://schemas.microsoft.com/office/drawing/2014/main" id="{6A4515E3-507A-4EF8-8D8F-A9DD3D87F4CF}"/>
+          <p:cNvPr id="45" name="Rectangle: Rounded Corners 44">
+            <a:extLst>
+              <a:ext uri="{FF2B5EF4-FFF2-40B4-BE49-F238E27FC236}">
+                <a16:creationId xmlns:a16="http://schemas.microsoft.com/office/drawing/2014/main" id="{9B3BE93B-35B7-4082-8BB2-7A02EE5864B6}"/>
               </a:ext>
             </a:extLst>
           </p:cNvPr>
@@ -3797,18 +3823,22 @@
         </p:nvSpPr>
         <p:spPr>
           <a:xfrm>
-            <a:off x="6858002" y="1785486"/>
-            <a:ext cx="2095500" cy="1765846"/>
-          </a:xfrm>
-          <a:prstGeom prst="star7">
+            <a:off x="4756150" y="1968500"/>
+            <a:ext cx="2160000" cy="1080000"/>
+          </a:xfrm>
+          <a:prstGeom prst="roundRect">
             <a:avLst/>
           </a:prstGeom>
           <a:solidFill>
-            <a:srgbClr val="007E39"/>
-          </a:solidFill>
-          <a:ln w="127000">
+            <a:schemeClr val="accent4">
+              <a:lumMod val="75000"/>
+            </a:schemeClr>
+          </a:solidFill>
+          <a:ln w="254000">
             <a:solidFill>
-              <a:srgbClr val="006C31"/>
+              <a:schemeClr val="accent4">
+                <a:lumMod val="50000"/>
+              </a:schemeClr>
             </a:solidFill>
           </a:ln>
         </p:spPr>
@@ -3839,10 +3869,10 @@
       </p:sp>
       <p:sp>
         <p:nvSpPr>
-          <p:cNvPr id="13" name="Star: 7 Points 12">
-            <a:extLst>
-              <a:ext uri="{FF2B5EF4-FFF2-40B4-BE49-F238E27FC236}">
-                <a16:creationId xmlns:a16="http://schemas.microsoft.com/office/drawing/2014/main" id="{66BDC168-0CF4-4729-A30E-4760F4031D54}"/>
+          <p:cNvPr id="46" name="Rectangle: Rounded Corners 45">
+            <a:extLst>
+              <a:ext uri="{FF2B5EF4-FFF2-40B4-BE49-F238E27FC236}">
+                <a16:creationId xmlns:a16="http://schemas.microsoft.com/office/drawing/2014/main" id="{2953C75A-8358-4BDF-A8E4-2BE274E900AF}"/>
               </a:ext>
             </a:extLst>
           </p:cNvPr>
@@ -3851,18 +3881,22 @@
         </p:nvSpPr>
         <p:spPr>
           <a:xfrm>
-            <a:off x="7378702" y="2246122"/>
-            <a:ext cx="1079500" cy="782377"/>
-          </a:xfrm>
-          <a:prstGeom prst="star7">
+            <a:off x="463550" y="1968500"/>
+            <a:ext cx="2160000" cy="1080000"/>
+          </a:xfrm>
+          <a:prstGeom prst="roundRect">
             <a:avLst/>
           </a:prstGeom>
           <a:solidFill>
-            <a:srgbClr val="007E39"/>
-          </a:solidFill>
-          <a:ln w="127000">
+            <a:schemeClr val="accent4">
+              <a:lumMod val="75000"/>
+            </a:schemeClr>
+          </a:solidFill>
+          <a:ln w="254000">
             <a:solidFill>
-              <a:srgbClr val="006C31"/>
+              <a:schemeClr val="accent4">
+                <a:lumMod val="50000"/>
+              </a:schemeClr>
             </a:solidFill>
           </a:ln>
         </p:spPr>
@@ -3894,7 +3928,7 @@
     </p:spTree>
     <p:extLst>
       <p:ext uri="{BB962C8B-B14F-4D97-AF65-F5344CB8AC3E}">
-        <p14:creationId xmlns:p14="http://schemas.microsoft.com/office/powerpoint/2010/main" val="1025106934"/>
+        <p14:creationId xmlns:p14="http://schemas.microsoft.com/office/powerpoint/2010/main" val="3637893405"/>
       </p:ext>
     </p:extLst>
   </p:cSld>
@@ -3923,6 +3957,1670 @@
       </p:grpSpPr>
       <p:sp>
         <p:nvSpPr>
+          <p:cNvPr id="36" name="Rectangle: Rounded Corners 35">
+            <a:extLst>
+              <a:ext uri="{FF2B5EF4-FFF2-40B4-BE49-F238E27FC236}">
+                <a16:creationId xmlns:a16="http://schemas.microsoft.com/office/drawing/2014/main" id="{3D719D88-25C7-480E-8EF7-F89B98405D25}"/>
+              </a:ext>
+            </a:extLst>
+          </p:cNvPr>
+          <p:cNvSpPr/>
+          <p:nvPr/>
+        </p:nvSpPr>
+        <p:spPr>
+          <a:xfrm rot="5400000">
+            <a:off x="1955550" y="4744700"/>
+            <a:ext cx="2160000" cy="1080000"/>
+          </a:xfrm>
+          <a:prstGeom prst="roundRect">
+            <a:avLst>
+              <a:gd name="adj" fmla="val 36658"/>
+            </a:avLst>
+          </a:prstGeom>
+          <a:solidFill>
+            <a:schemeClr val="accent4">
+              <a:lumMod val="75000"/>
+            </a:schemeClr>
+          </a:solidFill>
+          <a:ln w="254000">
+            <a:solidFill>
+              <a:schemeClr val="accent4">
+                <a:lumMod val="50000"/>
+              </a:schemeClr>
+            </a:solidFill>
+          </a:ln>
+        </p:spPr>
+        <p:style>
+          <a:lnRef idx="2">
+            <a:schemeClr val="accent1">
+              <a:shade val="50000"/>
+            </a:schemeClr>
+          </a:lnRef>
+          <a:fillRef idx="1">
+            <a:schemeClr val="accent1"/>
+          </a:fillRef>
+          <a:effectRef idx="0">
+            <a:schemeClr val="accent1"/>
+          </a:effectRef>
+          <a:fontRef idx="minor">
+            <a:schemeClr val="lt1"/>
+          </a:fontRef>
+        </p:style>
+        <p:txBody>
+          <a:bodyPr rtlCol="0" anchor="ctr"/>
+          <a:lstStyle/>
+          <a:p>
+            <a:pPr algn="ctr"/>
+            <a:endParaRPr lang="en-GB"/>
+          </a:p>
+        </p:txBody>
+      </p:sp>
+      <p:sp>
+        <p:nvSpPr>
+          <p:cNvPr id="35" name="Rectangle: Rounded Corners 34">
+            <a:extLst>
+              <a:ext uri="{FF2B5EF4-FFF2-40B4-BE49-F238E27FC236}">
+                <a16:creationId xmlns:a16="http://schemas.microsoft.com/office/drawing/2014/main" id="{2F747C3A-9793-49B4-9259-EB1A125C52A1}"/>
+              </a:ext>
+            </a:extLst>
+          </p:cNvPr>
+          <p:cNvSpPr/>
+          <p:nvPr/>
+        </p:nvSpPr>
+        <p:spPr>
+          <a:xfrm rot="5400000">
+            <a:off x="7355550" y="4744700"/>
+            <a:ext cx="2160000" cy="1080000"/>
+          </a:xfrm>
+          <a:prstGeom prst="roundRect">
+            <a:avLst>
+              <a:gd name="adj" fmla="val 36658"/>
+            </a:avLst>
+          </a:prstGeom>
+          <a:solidFill>
+            <a:schemeClr val="accent4">
+              <a:lumMod val="75000"/>
+            </a:schemeClr>
+          </a:solidFill>
+          <a:ln w="254000">
+            <a:solidFill>
+              <a:schemeClr val="accent4">
+                <a:lumMod val="50000"/>
+              </a:schemeClr>
+            </a:solidFill>
+          </a:ln>
+        </p:spPr>
+        <p:style>
+          <a:lnRef idx="2">
+            <a:schemeClr val="accent1">
+              <a:shade val="50000"/>
+            </a:schemeClr>
+          </a:lnRef>
+          <a:fillRef idx="1">
+            <a:schemeClr val="accent1"/>
+          </a:fillRef>
+          <a:effectRef idx="0">
+            <a:schemeClr val="accent1"/>
+          </a:effectRef>
+          <a:fontRef idx="minor">
+            <a:schemeClr val="lt1"/>
+          </a:fontRef>
+        </p:style>
+        <p:txBody>
+          <a:bodyPr rtlCol="0" anchor="ctr"/>
+          <a:lstStyle/>
+          <a:p>
+            <a:pPr algn="ctr"/>
+            <a:endParaRPr lang="en-GB"/>
+          </a:p>
+        </p:txBody>
+      </p:sp>
+      <p:sp>
+        <p:nvSpPr>
+          <p:cNvPr id="31" name="Rectangle: Rounded Corners 30">
+            <a:extLst>
+              <a:ext uri="{FF2B5EF4-FFF2-40B4-BE49-F238E27FC236}">
+                <a16:creationId xmlns:a16="http://schemas.microsoft.com/office/drawing/2014/main" id="{9FCC406C-E70C-4327-AFAF-87930CFD54D5}"/>
+              </a:ext>
+            </a:extLst>
+          </p:cNvPr>
+          <p:cNvSpPr/>
+          <p:nvPr/>
+        </p:nvSpPr>
+        <p:spPr>
+          <a:xfrm>
+            <a:off x="3575550" y="4204700"/>
+            <a:ext cx="2160000" cy="1080000"/>
+          </a:xfrm>
+          <a:prstGeom prst="roundRect">
+            <a:avLst>
+              <a:gd name="adj" fmla="val 36658"/>
+            </a:avLst>
+          </a:prstGeom>
+          <a:solidFill>
+            <a:schemeClr val="accent4">
+              <a:lumMod val="75000"/>
+            </a:schemeClr>
+          </a:solidFill>
+          <a:ln w="254000">
+            <a:solidFill>
+              <a:schemeClr val="accent4">
+                <a:lumMod val="50000"/>
+              </a:schemeClr>
+            </a:solidFill>
+          </a:ln>
+        </p:spPr>
+        <p:style>
+          <a:lnRef idx="2">
+            <a:schemeClr val="accent1">
+              <a:shade val="50000"/>
+            </a:schemeClr>
+          </a:lnRef>
+          <a:fillRef idx="1">
+            <a:schemeClr val="accent1"/>
+          </a:fillRef>
+          <a:effectRef idx="0">
+            <a:schemeClr val="accent1"/>
+          </a:effectRef>
+          <a:fontRef idx="minor">
+            <a:schemeClr val="lt1"/>
+          </a:fontRef>
+        </p:style>
+        <p:txBody>
+          <a:bodyPr rtlCol="0" anchor="ctr"/>
+          <a:lstStyle/>
+          <a:p>
+            <a:pPr algn="ctr"/>
+            <a:endParaRPr lang="en-GB"/>
+          </a:p>
+        </p:txBody>
+      </p:sp>
+      <p:sp>
+        <p:nvSpPr>
+          <p:cNvPr id="32" name="Rectangle: Rounded Corners 31">
+            <a:extLst>
+              <a:ext uri="{FF2B5EF4-FFF2-40B4-BE49-F238E27FC236}">
+                <a16:creationId xmlns:a16="http://schemas.microsoft.com/office/drawing/2014/main" id="{620465F1-542B-4107-B6BB-76D536A9AB3E}"/>
+              </a:ext>
+            </a:extLst>
+          </p:cNvPr>
+          <p:cNvSpPr/>
+          <p:nvPr/>
+        </p:nvSpPr>
+        <p:spPr>
+          <a:xfrm>
+            <a:off x="3575550" y="5284700"/>
+            <a:ext cx="2160000" cy="1080000"/>
+          </a:xfrm>
+          <a:prstGeom prst="roundRect">
+            <a:avLst>
+              <a:gd name="adj" fmla="val 36658"/>
+            </a:avLst>
+          </a:prstGeom>
+          <a:solidFill>
+            <a:schemeClr val="accent4">
+              <a:lumMod val="75000"/>
+            </a:schemeClr>
+          </a:solidFill>
+          <a:ln w="254000">
+            <a:solidFill>
+              <a:schemeClr val="accent4">
+                <a:lumMod val="50000"/>
+              </a:schemeClr>
+            </a:solidFill>
+          </a:ln>
+        </p:spPr>
+        <p:style>
+          <a:lnRef idx="2">
+            <a:schemeClr val="accent1">
+              <a:shade val="50000"/>
+            </a:schemeClr>
+          </a:lnRef>
+          <a:fillRef idx="1">
+            <a:schemeClr val="accent1"/>
+          </a:fillRef>
+          <a:effectRef idx="0">
+            <a:schemeClr val="accent1"/>
+          </a:effectRef>
+          <a:fontRef idx="minor">
+            <a:schemeClr val="lt1"/>
+          </a:fontRef>
+        </p:style>
+        <p:txBody>
+          <a:bodyPr rtlCol="0" anchor="ctr"/>
+          <a:lstStyle/>
+          <a:p>
+            <a:pPr algn="ctr"/>
+            <a:endParaRPr lang="en-GB"/>
+          </a:p>
+        </p:txBody>
+      </p:sp>
+      <p:sp>
+        <p:nvSpPr>
+          <p:cNvPr id="33" name="Rectangle: Rounded Corners 32">
+            <a:extLst>
+              <a:ext uri="{FF2B5EF4-FFF2-40B4-BE49-F238E27FC236}">
+                <a16:creationId xmlns:a16="http://schemas.microsoft.com/office/drawing/2014/main" id="{F37358D6-9993-4CA3-8719-E2F5F0093FC8}"/>
+              </a:ext>
+            </a:extLst>
+          </p:cNvPr>
+          <p:cNvSpPr/>
+          <p:nvPr/>
+        </p:nvSpPr>
+        <p:spPr>
+          <a:xfrm>
+            <a:off x="5735550" y="4204700"/>
+            <a:ext cx="2160000" cy="1080000"/>
+          </a:xfrm>
+          <a:prstGeom prst="roundRect">
+            <a:avLst>
+              <a:gd name="adj" fmla="val 36658"/>
+            </a:avLst>
+          </a:prstGeom>
+          <a:solidFill>
+            <a:schemeClr val="accent4">
+              <a:lumMod val="75000"/>
+            </a:schemeClr>
+          </a:solidFill>
+          <a:ln w="254000">
+            <a:solidFill>
+              <a:schemeClr val="accent4">
+                <a:lumMod val="50000"/>
+              </a:schemeClr>
+            </a:solidFill>
+          </a:ln>
+        </p:spPr>
+        <p:style>
+          <a:lnRef idx="2">
+            <a:schemeClr val="accent1">
+              <a:shade val="50000"/>
+            </a:schemeClr>
+          </a:lnRef>
+          <a:fillRef idx="1">
+            <a:schemeClr val="accent1"/>
+          </a:fillRef>
+          <a:effectRef idx="0">
+            <a:schemeClr val="accent1"/>
+          </a:effectRef>
+          <a:fontRef idx="minor">
+            <a:schemeClr val="lt1"/>
+          </a:fontRef>
+        </p:style>
+        <p:txBody>
+          <a:bodyPr rtlCol="0" anchor="ctr"/>
+          <a:lstStyle/>
+          <a:p>
+            <a:pPr algn="ctr"/>
+            <a:endParaRPr lang="en-GB"/>
+          </a:p>
+        </p:txBody>
+      </p:sp>
+      <p:sp>
+        <p:nvSpPr>
+          <p:cNvPr id="34" name="Rectangle: Rounded Corners 33">
+            <a:extLst>
+              <a:ext uri="{FF2B5EF4-FFF2-40B4-BE49-F238E27FC236}">
+                <a16:creationId xmlns:a16="http://schemas.microsoft.com/office/drawing/2014/main" id="{067DB705-64C6-47FE-A0C3-4E9BEA3F10E6}"/>
+              </a:ext>
+            </a:extLst>
+          </p:cNvPr>
+          <p:cNvSpPr/>
+          <p:nvPr/>
+        </p:nvSpPr>
+        <p:spPr>
+          <a:xfrm>
+            <a:off x="5735550" y="5284700"/>
+            <a:ext cx="2160000" cy="1080000"/>
+          </a:xfrm>
+          <a:prstGeom prst="roundRect">
+            <a:avLst>
+              <a:gd name="adj" fmla="val 36658"/>
+            </a:avLst>
+          </a:prstGeom>
+          <a:solidFill>
+            <a:schemeClr val="accent4">
+              <a:lumMod val="75000"/>
+            </a:schemeClr>
+          </a:solidFill>
+          <a:ln w="254000">
+            <a:solidFill>
+              <a:schemeClr val="accent4">
+                <a:lumMod val="50000"/>
+              </a:schemeClr>
+            </a:solidFill>
+          </a:ln>
+        </p:spPr>
+        <p:style>
+          <a:lnRef idx="2">
+            <a:schemeClr val="accent1">
+              <a:shade val="50000"/>
+            </a:schemeClr>
+          </a:lnRef>
+          <a:fillRef idx="1">
+            <a:schemeClr val="accent1"/>
+          </a:fillRef>
+          <a:effectRef idx="0">
+            <a:schemeClr val="accent1"/>
+          </a:effectRef>
+          <a:fontRef idx="minor">
+            <a:schemeClr val="lt1"/>
+          </a:fontRef>
+        </p:style>
+        <p:txBody>
+          <a:bodyPr rtlCol="0" anchor="ctr"/>
+          <a:lstStyle/>
+          <a:p>
+            <a:pPr algn="ctr"/>
+            <a:endParaRPr lang="en-GB"/>
+          </a:p>
+        </p:txBody>
+      </p:sp>
+      <p:sp>
+        <p:nvSpPr>
+          <p:cNvPr id="19" name="Rectangle: Rounded Corners 18">
+            <a:extLst>
+              <a:ext uri="{FF2B5EF4-FFF2-40B4-BE49-F238E27FC236}">
+                <a16:creationId xmlns:a16="http://schemas.microsoft.com/office/drawing/2014/main" id="{EFAE9C13-6895-4EA1-8A48-E8B152499A39}"/>
+              </a:ext>
+            </a:extLst>
+          </p:cNvPr>
+          <p:cNvSpPr/>
+          <p:nvPr/>
+        </p:nvSpPr>
+        <p:spPr>
+          <a:xfrm rot="5400000">
+            <a:off x="-75450" y="1974600"/>
+            <a:ext cx="2160000" cy="1080000"/>
+          </a:xfrm>
+          <a:prstGeom prst="roundRect">
+            <a:avLst/>
+          </a:prstGeom>
+          <a:solidFill>
+            <a:schemeClr val="accent4">
+              <a:lumMod val="75000"/>
+            </a:schemeClr>
+          </a:solidFill>
+          <a:ln w="254000">
+            <a:solidFill>
+              <a:schemeClr val="accent4">
+                <a:lumMod val="50000"/>
+              </a:schemeClr>
+            </a:solidFill>
+          </a:ln>
+        </p:spPr>
+        <p:style>
+          <a:lnRef idx="2">
+            <a:schemeClr val="accent1">
+              <a:shade val="50000"/>
+            </a:schemeClr>
+          </a:lnRef>
+          <a:fillRef idx="1">
+            <a:schemeClr val="accent1"/>
+          </a:fillRef>
+          <a:effectRef idx="0">
+            <a:schemeClr val="accent1"/>
+          </a:effectRef>
+          <a:fontRef idx="minor">
+            <a:schemeClr val="lt1"/>
+          </a:fontRef>
+        </p:style>
+        <p:txBody>
+          <a:bodyPr rtlCol="0" anchor="ctr"/>
+          <a:lstStyle/>
+          <a:p>
+            <a:pPr algn="ctr"/>
+            <a:endParaRPr lang="en-GB"/>
+          </a:p>
+        </p:txBody>
+      </p:sp>
+      <p:sp>
+        <p:nvSpPr>
+          <p:cNvPr id="18" name="Rectangle: Rounded Corners 17">
+            <a:extLst>
+              <a:ext uri="{FF2B5EF4-FFF2-40B4-BE49-F238E27FC236}">
+                <a16:creationId xmlns:a16="http://schemas.microsoft.com/office/drawing/2014/main" id="{C300DB5F-2C2E-4688-ABCD-64D3D6596DE8}"/>
+              </a:ext>
+            </a:extLst>
+          </p:cNvPr>
+          <p:cNvSpPr/>
+          <p:nvPr/>
+        </p:nvSpPr>
+        <p:spPr>
+          <a:xfrm rot="5400000">
+            <a:off x="5303000" y="1968500"/>
+            <a:ext cx="2160000" cy="1080000"/>
+          </a:xfrm>
+          <a:prstGeom prst="roundRect">
+            <a:avLst/>
+          </a:prstGeom>
+          <a:solidFill>
+            <a:schemeClr val="accent4">
+              <a:lumMod val="75000"/>
+            </a:schemeClr>
+          </a:solidFill>
+          <a:ln w="254000">
+            <a:solidFill>
+              <a:schemeClr val="accent4">
+                <a:lumMod val="50000"/>
+              </a:schemeClr>
+            </a:solidFill>
+          </a:ln>
+        </p:spPr>
+        <p:style>
+          <a:lnRef idx="2">
+            <a:schemeClr val="accent1">
+              <a:shade val="50000"/>
+            </a:schemeClr>
+          </a:lnRef>
+          <a:fillRef idx="1">
+            <a:schemeClr val="accent1"/>
+          </a:fillRef>
+          <a:effectRef idx="0">
+            <a:schemeClr val="accent1"/>
+          </a:effectRef>
+          <a:fontRef idx="minor">
+            <a:schemeClr val="lt1"/>
+          </a:fontRef>
+        </p:style>
+        <p:txBody>
+          <a:bodyPr rtlCol="0" anchor="ctr"/>
+          <a:lstStyle/>
+          <a:p>
+            <a:pPr algn="ctr"/>
+            <a:endParaRPr lang="en-GB"/>
+          </a:p>
+        </p:txBody>
+      </p:sp>
+      <p:sp>
+        <p:nvSpPr>
+          <p:cNvPr id="13" name="Rectangle: Rounded Corners 12">
+            <a:extLst>
+              <a:ext uri="{FF2B5EF4-FFF2-40B4-BE49-F238E27FC236}">
+                <a16:creationId xmlns:a16="http://schemas.microsoft.com/office/drawing/2014/main" id="{E5A5A675-B201-476E-B6BE-9001C9037E46}"/>
+              </a:ext>
+            </a:extLst>
+          </p:cNvPr>
+          <p:cNvSpPr/>
+          <p:nvPr/>
+        </p:nvSpPr>
+        <p:spPr>
+          <a:xfrm>
+            <a:off x="1536700" y="1409700"/>
+            <a:ext cx="2160000" cy="1080000"/>
+          </a:xfrm>
+          <a:prstGeom prst="roundRect">
+            <a:avLst/>
+          </a:prstGeom>
+          <a:solidFill>
+            <a:schemeClr val="accent4">
+              <a:lumMod val="75000"/>
+            </a:schemeClr>
+          </a:solidFill>
+          <a:ln w="254000">
+            <a:solidFill>
+              <a:schemeClr val="accent4">
+                <a:lumMod val="50000"/>
+              </a:schemeClr>
+            </a:solidFill>
+          </a:ln>
+        </p:spPr>
+        <p:style>
+          <a:lnRef idx="2">
+            <a:schemeClr val="accent1">
+              <a:shade val="50000"/>
+            </a:schemeClr>
+          </a:lnRef>
+          <a:fillRef idx="1">
+            <a:schemeClr val="accent1"/>
+          </a:fillRef>
+          <a:effectRef idx="0">
+            <a:schemeClr val="accent1"/>
+          </a:effectRef>
+          <a:fontRef idx="minor">
+            <a:schemeClr val="lt1"/>
+          </a:fontRef>
+        </p:style>
+        <p:txBody>
+          <a:bodyPr rtlCol="0" anchor="ctr"/>
+          <a:lstStyle/>
+          <a:p>
+            <a:pPr algn="ctr"/>
+            <a:endParaRPr lang="en-GB"/>
+          </a:p>
+        </p:txBody>
+      </p:sp>
+      <p:sp>
+        <p:nvSpPr>
+          <p:cNvPr id="14" name="Rectangle: Rounded Corners 13">
+            <a:extLst>
+              <a:ext uri="{FF2B5EF4-FFF2-40B4-BE49-F238E27FC236}">
+                <a16:creationId xmlns:a16="http://schemas.microsoft.com/office/drawing/2014/main" id="{7A9A4C86-AE6C-4CBF-9438-35B1BEAADEB8}"/>
+              </a:ext>
+            </a:extLst>
+          </p:cNvPr>
+          <p:cNvSpPr/>
+          <p:nvPr/>
+        </p:nvSpPr>
+        <p:spPr>
+          <a:xfrm>
+            <a:off x="3683000" y="1409700"/>
+            <a:ext cx="2160000" cy="1080000"/>
+          </a:xfrm>
+          <a:prstGeom prst="roundRect">
+            <a:avLst/>
+          </a:prstGeom>
+          <a:solidFill>
+            <a:schemeClr val="accent4">
+              <a:lumMod val="75000"/>
+            </a:schemeClr>
+          </a:solidFill>
+          <a:ln w="254000">
+            <a:solidFill>
+              <a:schemeClr val="accent4">
+                <a:lumMod val="50000"/>
+              </a:schemeClr>
+            </a:solidFill>
+          </a:ln>
+        </p:spPr>
+        <p:style>
+          <a:lnRef idx="2">
+            <a:schemeClr val="accent1">
+              <a:shade val="50000"/>
+            </a:schemeClr>
+          </a:lnRef>
+          <a:fillRef idx="1">
+            <a:schemeClr val="accent1"/>
+          </a:fillRef>
+          <a:effectRef idx="0">
+            <a:schemeClr val="accent1"/>
+          </a:effectRef>
+          <a:fontRef idx="minor">
+            <a:schemeClr val="lt1"/>
+          </a:fontRef>
+        </p:style>
+        <p:txBody>
+          <a:bodyPr rtlCol="0" anchor="ctr"/>
+          <a:lstStyle/>
+          <a:p>
+            <a:pPr algn="ctr"/>
+            <a:endParaRPr lang="en-GB"/>
+          </a:p>
+        </p:txBody>
+      </p:sp>
+      <p:sp>
+        <p:nvSpPr>
+          <p:cNvPr id="8" name="Rectangle: Rounded Corners 7">
+            <a:extLst>
+              <a:ext uri="{FF2B5EF4-FFF2-40B4-BE49-F238E27FC236}">
+                <a16:creationId xmlns:a16="http://schemas.microsoft.com/office/drawing/2014/main" id="{2905D7B8-4D64-47D7-873A-A41CBEC61132}"/>
+              </a:ext>
+            </a:extLst>
+          </p:cNvPr>
+          <p:cNvSpPr/>
+          <p:nvPr/>
+        </p:nvSpPr>
+        <p:spPr>
+          <a:xfrm>
+            <a:off x="1536700" y="2527300"/>
+            <a:ext cx="2160000" cy="1080000"/>
+          </a:xfrm>
+          <a:prstGeom prst="roundRect">
+            <a:avLst/>
+          </a:prstGeom>
+          <a:solidFill>
+            <a:schemeClr val="accent4">
+              <a:lumMod val="75000"/>
+            </a:schemeClr>
+          </a:solidFill>
+          <a:ln w="254000">
+            <a:solidFill>
+              <a:schemeClr val="accent4">
+                <a:lumMod val="50000"/>
+              </a:schemeClr>
+            </a:solidFill>
+          </a:ln>
+        </p:spPr>
+        <p:style>
+          <a:lnRef idx="2">
+            <a:schemeClr val="accent1">
+              <a:shade val="50000"/>
+            </a:schemeClr>
+          </a:lnRef>
+          <a:fillRef idx="1">
+            <a:schemeClr val="accent1"/>
+          </a:fillRef>
+          <a:effectRef idx="0">
+            <a:schemeClr val="accent1"/>
+          </a:effectRef>
+          <a:fontRef idx="minor">
+            <a:schemeClr val="lt1"/>
+          </a:fontRef>
+        </p:style>
+        <p:txBody>
+          <a:bodyPr rtlCol="0" anchor="ctr"/>
+          <a:lstStyle/>
+          <a:p>
+            <a:pPr algn="ctr"/>
+            <a:endParaRPr lang="en-GB"/>
+          </a:p>
+        </p:txBody>
+      </p:sp>
+      <p:sp>
+        <p:nvSpPr>
+          <p:cNvPr id="9" name="Rectangle: Rounded Corners 8">
+            <a:extLst>
+              <a:ext uri="{FF2B5EF4-FFF2-40B4-BE49-F238E27FC236}">
+                <a16:creationId xmlns:a16="http://schemas.microsoft.com/office/drawing/2014/main" id="{50377FDA-87DE-4D57-BFD3-A27D7DFBE66A}"/>
+              </a:ext>
+            </a:extLst>
+          </p:cNvPr>
+          <p:cNvSpPr/>
+          <p:nvPr/>
+        </p:nvSpPr>
+        <p:spPr>
+          <a:xfrm>
+            <a:off x="3683000" y="2527300"/>
+            <a:ext cx="2160000" cy="1080000"/>
+          </a:xfrm>
+          <a:prstGeom prst="roundRect">
+            <a:avLst/>
+          </a:prstGeom>
+          <a:solidFill>
+            <a:schemeClr val="accent4">
+              <a:lumMod val="75000"/>
+            </a:schemeClr>
+          </a:solidFill>
+          <a:ln w="254000">
+            <a:solidFill>
+              <a:schemeClr val="accent4">
+                <a:lumMod val="50000"/>
+              </a:schemeClr>
+            </a:solidFill>
+          </a:ln>
+        </p:spPr>
+        <p:style>
+          <a:lnRef idx="2">
+            <a:schemeClr val="accent1">
+              <a:shade val="50000"/>
+            </a:schemeClr>
+          </a:lnRef>
+          <a:fillRef idx="1">
+            <a:schemeClr val="accent1"/>
+          </a:fillRef>
+          <a:effectRef idx="0">
+            <a:schemeClr val="accent1"/>
+          </a:effectRef>
+          <a:fontRef idx="minor">
+            <a:schemeClr val="lt1"/>
+          </a:fontRef>
+        </p:style>
+        <p:txBody>
+          <a:bodyPr rtlCol="0" anchor="ctr"/>
+          <a:lstStyle/>
+          <a:p>
+            <a:pPr algn="ctr"/>
+            <a:endParaRPr lang="en-GB"/>
+          </a:p>
+        </p:txBody>
+      </p:sp>
+      <p:sp>
+        <p:nvSpPr>
+          <p:cNvPr id="10" name="Rectangle: Rounded Corners 9">
+            <a:extLst>
+              <a:ext uri="{FF2B5EF4-FFF2-40B4-BE49-F238E27FC236}">
+                <a16:creationId xmlns:a16="http://schemas.microsoft.com/office/drawing/2014/main" id="{29B36081-BCBC-4D0D-8EB2-C64A4C103BC3}"/>
+              </a:ext>
+            </a:extLst>
+          </p:cNvPr>
+          <p:cNvSpPr/>
+          <p:nvPr/>
+        </p:nvSpPr>
+        <p:spPr>
+          <a:xfrm>
+            <a:off x="2609850" y="1968500"/>
+            <a:ext cx="2160000" cy="1080000"/>
+          </a:xfrm>
+          <a:prstGeom prst="roundRect">
+            <a:avLst/>
+          </a:prstGeom>
+          <a:solidFill>
+            <a:schemeClr val="accent4">
+              <a:lumMod val="75000"/>
+            </a:schemeClr>
+          </a:solidFill>
+          <a:ln w="254000">
+            <a:solidFill>
+              <a:schemeClr val="accent4">
+                <a:lumMod val="50000"/>
+              </a:schemeClr>
+            </a:solidFill>
+          </a:ln>
+        </p:spPr>
+        <p:style>
+          <a:lnRef idx="2">
+            <a:schemeClr val="accent1">
+              <a:shade val="50000"/>
+            </a:schemeClr>
+          </a:lnRef>
+          <a:fillRef idx="1">
+            <a:schemeClr val="accent1"/>
+          </a:fillRef>
+          <a:effectRef idx="0">
+            <a:schemeClr val="accent1"/>
+          </a:effectRef>
+          <a:fontRef idx="minor">
+            <a:schemeClr val="lt1"/>
+          </a:fontRef>
+        </p:style>
+        <p:txBody>
+          <a:bodyPr rtlCol="0" anchor="ctr"/>
+          <a:lstStyle/>
+          <a:p>
+            <a:pPr algn="ctr"/>
+            <a:endParaRPr lang="en-GB"/>
+          </a:p>
+        </p:txBody>
+      </p:sp>
+      <p:sp>
+        <p:nvSpPr>
+          <p:cNvPr id="11" name="Rectangle: Rounded Corners 10">
+            <a:extLst>
+              <a:ext uri="{FF2B5EF4-FFF2-40B4-BE49-F238E27FC236}">
+                <a16:creationId xmlns:a16="http://schemas.microsoft.com/office/drawing/2014/main" id="{F578CD7A-8277-4516-99BD-48C05940F6CA}"/>
+              </a:ext>
+            </a:extLst>
+          </p:cNvPr>
+          <p:cNvSpPr/>
+          <p:nvPr/>
+        </p:nvSpPr>
+        <p:spPr>
+          <a:xfrm>
+            <a:off x="4756150" y="1968500"/>
+            <a:ext cx="2160000" cy="1080000"/>
+          </a:xfrm>
+          <a:prstGeom prst="roundRect">
+            <a:avLst/>
+          </a:prstGeom>
+          <a:solidFill>
+            <a:schemeClr val="accent4">
+              <a:lumMod val="75000"/>
+            </a:schemeClr>
+          </a:solidFill>
+          <a:ln w="254000">
+            <a:solidFill>
+              <a:schemeClr val="accent4">
+                <a:lumMod val="50000"/>
+              </a:schemeClr>
+            </a:solidFill>
+          </a:ln>
+        </p:spPr>
+        <p:style>
+          <a:lnRef idx="2">
+            <a:schemeClr val="accent1">
+              <a:shade val="50000"/>
+            </a:schemeClr>
+          </a:lnRef>
+          <a:fillRef idx="1">
+            <a:schemeClr val="accent1"/>
+          </a:fillRef>
+          <a:effectRef idx="0">
+            <a:schemeClr val="accent1"/>
+          </a:effectRef>
+          <a:fontRef idx="minor">
+            <a:schemeClr val="lt1"/>
+          </a:fontRef>
+        </p:style>
+        <p:txBody>
+          <a:bodyPr rtlCol="0" anchor="ctr"/>
+          <a:lstStyle/>
+          <a:p>
+            <a:pPr algn="ctr"/>
+            <a:endParaRPr lang="en-GB"/>
+          </a:p>
+        </p:txBody>
+      </p:sp>
+      <p:sp>
+        <p:nvSpPr>
+          <p:cNvPr id="12" name="Rectangle: Rounded Corners 11">
+            <a:extLst>
+              <a:ext uri="{FF2B5EF4-FFF2-40B4-BE49-F238E27FC236}">
+                <a16:creationId xmlns:a16="http://schemas.microsoft.com/office/drawing/2014/main" id="{B211D85B-605E-43D9-8A39-9FEA7A4E161A}"/>
+              </a:ext>
+            </a:extLst>
+          </p:cNvPr>
+          <p:cNvSpPr/>
+          <p:nvPr/>
+        </p:nvSpPr>
+        <p:spPr>
+          <a:xfrm>
+            <a:off x="463550" y="1968500"/>
+            <a:ext cx="2160000" cy="1080000"/>
+          </a:xfrm>
+          <a:prstGeom prst="roundRect">
+            <a:avLst/>
+          </a:prstGeom>
+          <a:solidFill>
+            <a:schemeClr val="accent4">
+              <a:lumMod val="75000"/>
+            </a:schemeClr>
+          </a:solidFill>
+          <a:ln w="254000">
+            <a:solidFill>
+              <a:schemeClr val="accent4">
+                <a:lumMod val="50000"/>
+              </a:schemeClr>
+            </a:solidFill>
+          </a:ln>
+        </p:spPr>
+        <p:style>
+          <a:lnRef idx="2">
+            <a:schemeClr val="accent1">
+              <a:shade val="50000"/>
+            </a:schemeClr>
+          </a:lnRef>
+          <a:fillRef idx="1">
+            <a:schemeClr val="accent1"/>
+          </a:fillRef>
+          <a:effectRef idx="0">
+            <a:schemeClr val="accent1"/>
+          </a:effectRef>
+          <a:fontRef idx="minor">
+            <a:schemeClr val="lt1"/>
+          </a:fontRef>
+        </p:style>
+        <p:txBody>
+          <a:bodyPr rtlCol="0" anchor="ctr"/>
+          <a:lstStyle/>
+          <a:p>
+            <a:pPr algn="ctr"/>
+            <a:endParaRPr lang="en-GB"/>
+          </a:p>
+        </p:txBody>
+      </p:sp>
+      <p:sp>
+        <p:nvSpPr>
+          <p:cNvPr id="28" name="Rectangle: Rounded Corners 27">
+            <a:extLst>
+              <a:ext uri="{FF2B5EF4-FFF2-40B4-BE49-F238E27FC236}">
+                <a16:creationId xmlns:a16="http://schemas.microsoft.com/office/drawing/2014/main" id="{4A607BE0-B2DE-4CFC-BF0A-A0D3779E2F58}"/>
+              </a:ext>
+            </a:extLst>
+          </p:cNvPr>
+          <p:cNvSpPr/>
+          <p:nvPr/>
+        </p:nvSpPr>
+        <p:spPr>
+          <a:xfrm>
+            <a:off x="2495550" y="4744700"/>
+            <a:ext cx="2160000" cy="1080000"/>
+          </a:xfrm>
+          <a:prstGeom prst="roundRect">
+            <a:avLst>
+              <a:gd name="adj" fmla="val 36658"/>
+            </a:avLst>
+          </a:prstGeom>
+          <a:solidFill>
+            <a:schemeClr val="accent4">
+              <a:lumMod val="75000"/>
+            </a:schemeClr>
+          </a:solidFill>
+          <a:ln w="254000">
+            <a:solidFill>
+              <a:schemeClr val="accent4">
+                <a:lumMod val="50000"/>
+              </a:schemeClr>
+            </a:solidFill>
+          </a:ln>
+        </p:spPr>
+        <p:style>
+          <a:lnRef idx="2">
+            <a:schemeClr val="accent1">
+              <a:shade val="50000"/>
+            </a:schemeClr>
+          </a:lnRef>
+          <a:fillRef idx="1">
+            <a:schemeClr val="accent1"/>
+          </a:fillRef>
+          <a:effectRef idx="0">
+            <a:schemeClr val="accent1"/>
+          </a:effectRef>
+          <a:fontRef idx="minor">
+            <a:schemeClr val="lt1"/>
+          </a:fontRef>
+        </p:style>
+        <p:txBody>
+          <a:bodyPr rtlCol="0" anchor="ctr"/>
+          <a:lstStyle/>
+          <a:p>
+            <a:pPr algn="ctr"/>
+            <a:endParaRPr lang="en-GB"/>
+          </a:p>
+        </p:txBody>
+      </p:sp>
+      <p:sp>
+        <p:nvSpPr>
+          <p:cNvPr id="29" name="Rectangle: Rounded Corners 28">
+            <a:extLst>
+              <a:ext uri="{FF2B5EF4-FFF2-40B4-BE49-F238E27FC236}">
+                <a16:creationId xmlns:a16="http://schemas.microsoft.com/office/drawing/2014/main" id="{27F16365-BFED-4027-B1BE-677FE24FF36C}"/>
+              </a:ext>
+            </a:extLst>
+          </p:cNvPr>
+          <p:cNvSpPr/>
+          <p:nvPr/>
+        </p:nvSpPr>
+        <p:spPr>
+          <a:xfrm>
+            <a:off x="4655550" y="4744700"/>
+            <a:ext cx="2160000" cy="1080000"/>
+          </a:xfrm>
+          <a:prstGeom prst="roundRect">
+            <a:avLst>
+              <a:gd name="adj" fmla="val 36658"/>
+            </a:avLst>
+          </a:prstGeom>
+          <a:solidFill>
+            <a:schemeClr val="accent4">
+              <a:lumMod val="75000"/>
+            </a:schemeClr>
+          </a:solidFill>
+          <a:ln w="254000">
+            <a:solidFill>
+              <a:schemeClr val="accent4">
+                <a:lumMod val="50000"/>
+              </a:schemeClr>
+            </a:solidFill>
+          </a:ln>
+        </p:spPr>
+        <p:style>
+          <a:lnRef idx="2">
+            <a:schemeClr val="accent1">
+              <a:shade val="50000"/>
+            </a:schemeClr>
+          </a:lnRef>
+          <a:fillRef idx="1">
+            <a:schemeClr val="accent1"/>
+          </a:fillRef>
+          <a:effectRef idx="0">
+            <a:schemeClr val="accent1"/>
+          </a:effectRef>
+          <a:fontRef idx="minor">
+            <a:schemeClr val="lt1"/>
+          </a:fontRef>
+        </p:style>
+        <p:txBody>
+          <a:bodyPr rtlCol="0" anchor="ctr"/>
+          <a:lstStyle/>
+          <a:p>
+            <a:pPr algn="ctr"/>
+            <a:endParaRPr lang="en-GB"/>
+          </a:p>
+        </p:txBody>
+      </p:sp>
+      <p:sp>
+        <p:nvSpPr>
+          <p:cNvPr id="30" name="Rectangle: Rounded Corners 29">
+            <a:extLst>
+              <a:ext uri="{FF2B5EF4-FFF2-40B4-BE49-F238E27FC236}">
+                <a16:creationId xmlns:a16="http://schemas.microsoft.com/office/drawing/2014/main" id="{66B11CEC-6DEF-4AFE-9C32-E766573C41BB}"/>
+              </a:ext>
+            </a:extLst>
+          </p:cNvPr>
+          <p:cNvSpPr/>
+          <p:nvPr/>
+        </p:nvSpPr>
+        <p:spPr>
+          <a:xfrm>
+            <a:off x="6815550" y="4744700"/>
+            <a:ext cx="2160000" cy="1080000"/>
+          </a:xfrm>
+          <a:prstGeom prst="roundRect">
+            <a:avLst>
+              <a:gd name="adj" fmla="val 36658"/>
+            </a:avLst>
+          </a:prstGeom>
+          <a:solidFill>
+            <a:schemeClr val="accent4">
+              <a:lumMod val="75000"/>
+            </a:schemeClr>
+          </a:solidFill>
+          <a:ln w="254000">
+            <a:solidFill>
+              <a:schemeClr val="accent4">
+                <a:lumMod val="50000"/>
+              </a:schemeClr>
+            </a:solidFill>
+          </a:ln>
+        </p:spPr>
+        <p:style>
+          <a:lnRef idx="2">
+            <a:schemeClr val="accent1">
+              <a:shade val="50000"/>
+            </a:schemeClr>
+          </a:lnRef>
+          <a:fillRef idx="1">
+            <a:schemeClr val="accent1"/>
+          </a:fillRef>
+          <a:effectRef idx="0">
+            <a:schemeClr val="accent1"/>
+          </a:effectRef>
+          <a:fontRef idx="minor">
+            <a:schemeClr val="lt1"/>
+          </a:fontRef>
+        </p:style>
+        <p:txBody>
+          <a:bodyPr rtlCol="0" anchor="ctr"/>
+          <a:lstStyle/>
+          <a:p>
+            <a:pPr algn="ctr"/>
+            <a:endParaRPr lang="en-GB"/>
+          </a:p>
+        </p:txBody>
+      </p:sp>
+    </p:spTree>
+    <p:extLst>
+      <p:ext uri="{BB962C8B-B14F-4D97-AF65-F5344CB8AC3E}">
+        <p14:creationId xmlns:p14="http://schemas.microsoft.com/office/powerpoint/2010/main" val="749646185"/>
+      </p:ext>
+    </p:extLst>
+  </p:cSld>
+  <p:clrMapOvr>
+    <a:masterClrMapping/>
+  </p:clrMapOvr>
+</p:sld>
+</file>
+
+<file path=ppt/slides/slide3.xml><?xml version="1.0" encoding="utf-8"?>
+<p:sld xmlns:a="http://schemas.openxmlformats.org/drawingml/2006/main" xmlns:r="http://schemas.openxmlformats.org/officeDocument/2006/relationships" xmlns:p="http://schemas.openxmlformats.org/presentationml/2006/main">
+  <p:cSld>
+    <p:spTree>
+      <p:nvGrpSpPr>
+        <p:cNvPr id="1" name=""/>
+        <p:cNvGrpSpPr/>
+        <p:nvPr/>
+      </p:nvGrpSpPr>
+      <p:grpSpPr>
+        <a:xfrm>
+          <a:off x="0" y="0"/>
+          <a:ext cx="0" cy="0"/>
+          <a:chOff x="0" y="0"/>
+          <a:chExt cx="0" cy="0"/>
+        </a:xfrm>
+      </p:grpSpPr>
+      <p:sp>
+        <p:nvSpPr>
+          <p:cNvPr id="6" name="Cloud 5">
+            <a:extLst>
+              <a:ext uri="{FF2B5EF4-FFF2-40B4-BE49-F238E27FC236}">
+                <a16:creationId xmlns:a16="http://schemas.microsoft.com/office/drawing/2014/main" id="{1BDF2AC8-AB8D-4F7D-B531-4404B67F5038}"/>
+              </a:ext>
+            </a:extLst>
+          </p:cNvPr>
+          <p:cNvSpPr/>
+          <p:nvPr/>
+        </p:nvSpPr>
+        <p:spPr>
+          <a:xfrm>
+            <a:off x="656839" y="226244"/>
+            <a:ext cx="3093720" cy="2487930"/>
+          </a:xfrm>
+          <a:prstGeom prst="cloud">
+            <a:avLst/>
+          </a:prstGeom>
+          <a:solidFill>
+            <a:srgbClr val="009242"/>
+          </a:solidFill>
+          <a:ln>
+            <a:noFill/>
+          </a:ln>
+        </p:spPr>
+        <p:style>
+          <a:lnRef idx="2">
+            <a:schemeClr val="accent1">
+              <a:shade val="50000"/>
+            </a:schemeClr>
+          </a:lnRef>
+          <a:fillRef idx="1">
+            <a:schemeClr val="accent1"/>
+          </a:fillRef>
+          <a:effectRef idx="0">
+            <a:schemeClr val="accent1"/>
+          </a:effectRef>
+          <a:fontRef idx="minor">
+            <a:schemeClr val="lt1"/>
+          </a:fontRef>
+        </p:style>
+        <p:txBody>
+          <a:bodyPr rtlCol="0" anchor="ctr"/>
+          <a:lstStyle/>
+          <a:p>
+            <a:pPr algn="ctr"/>
+            <a:endParaRPr lang="en-GB"/>
+          </a:p>
+        </p:txBody>
+      </p:sp>
+      <p:sp>
+        <p:nvSpPr>
+          <p:cNvPr id="7" name="Star: 7 Points 6">
+            <a:extLst>
+              <a:ext uri="{FF2B5EF4-FFF2-40B4-BE49-F238E27FC236}">
+                <a16:creationId xmlns:a16="http://schemas.microsoft.com/office/drawing/2014/main" id="{6DD4FEFD-CEE4-42E1-B502-731EE6EFE62E}"/>
+              </a:ext>
+            </a:extLst>
+          </p:cNvPr>
+          <p:cNvSpPr/>
+          <p:nvPr/>
+        </p:nvSpPr>
+        <p:spPr>
+          <a:xfrm>
+            <a:off x="972837" y="226244"/>
+            <a:ext cx="2668435" cy="2420664"/>
+          </a:xfrm>
+          <a:prstGeom prst="star7">
+            <a:avLst>
+              <a:gd name="adj" fmla="val 38686"/>
+              <a:gd name="hf" fmla="val 102572"/>
+              <a:gd name="vf" fmla="val 105210"/>
+            </a:avLst>
+          </a:prstGeom>
+          <a:solidFill>
+            <a:srgbClr val="007E39"/>
+          </a:solidFill>
+          <a:ln>
+            <a:noFill/>
+          </a:ln>
+        </p:spPr>
+        <p:style>
+          <a:lnRef idx="2">
+            <a:schemeClr val="accent1">
+              <a:shade val="50000"/>
+            </a:schemeClr>
+          </a:lnRef>
+          <a:fillRef idx="1">
+            <a:schemeClr val="accent1"/>
+          </a:fillRef>
+          <a:effectRef idx="0">
+            <a:schemeClr val="accent1"/>
+          </a:effectRef>
+          <a:fontRef idx="minor">
+            <a:schemeClr val="lt1"/>
+          </a:fontRef>
+        </p:style>
+        <p:txBody>
+          <a:bodyPr rtlCol="0" anchor="ctr"/>
+          <a:lstStyle/>
+          <a:p>
+            <a:pPr algn="ctr"/>
+            <a:endParaRPr lang="en-GB"/>
+          </a:p>
+        </p:txBody>
+      </p:sp>
+      <p:sp>
+        <p:nvSpPr>
+          <p:cNvPr id="5" name="Star: 7 Points 4">
+            <a:extLst>
+              <a:ext uri="{FF2B5EF4-FFF2-40B4-BE49-F238E27FC236}">
+                <a16:creationId xmlns:a16="http://schemas.microsoft.com/office/drawing/2014/main" id="{883A7932-06E5-4801-B4E5-5277E4B3AC82}"/>
+              </a:ext>
+            </a:extLst>
+          </p:cNvPr>
+          <p:cNvSpPr/>
+          <p:nvPr/>
+        </p:nvSpPr>
+        <p:spPr>
+          <a:xfrm>
+            <a:off x="1232149" y="457200"/>
+            <a:ext cx="1943100" cy="1704975"/>
+          </a:xfrm>
+          <a:prstGeom prst="star7">
+            <a:avLst>
+              <a:gd name="adj" fmla="val 38686"/>
+              <a:gd name="hf" fmla="val 102572"/>
+              <a:gd name="vf" fmla="val 105210"/>
+            </a:avLst>
+          </a:prstGeom>
+          <a:solidFill>
+            <a:srgbClr val="006C31"/>
+          </a:solidFill>
+          <a:ln>
+            <a:noFill/>
+          </a:ln>
+        </p:spPr>
+        <p:style>
+          <a:lnRef idx="2">
+            <a:schemeClr val="accent1">
+              <a:shade val="50000"/>
+            </a:schemeClr>
+          </a:lnRef>
+          <a:fillRef idx="1">
+            <a:schemeClr val="accent1"/>
+          </a:fillRef>
+          <a:effectRef idx="0">
+            <a:schemeClr val="accent1"/>
+          </a:effectRef>
+          <a:fontRef idx="minor">
+            <a:schemeClr val="lt1"/>
+          </a:fontRef>
+        </p:style>
+        <p:txBody>
+          <a:bodyPr rtlCol="0" anchor="ctr"/>
+          <a:lstStyle/>
+          <a:p>
+            <a:pPr algn="ctr"/>
+            <a:endParaRPr lang="en-GB"/>
+          </a:p>
+        </p:txBody>
+      </p:sp>
+      <p:sp>
+        <p:nvSpPr>
+          <p:cNvPr id="4" name="Hexagon 3">
+            <a:extLst>
+              <a:ext uri="{FF2B5EF4-FFF2-40B4-BE49-F238E27FC236}">
+                <a16:creationId xmlns:a16="http://schemas.microsoft.com/office/drawing/2014/main" id="{77872B03-221F-409C-9026-EBC33C465114}"/>
+              </a:ext>
+            </a:extLst>
+          </p:cNvPr>
+          <p:cNvSpPr/>
+          <p:nvPr/>
+        </p:nvSpPr>
+        <p:spPr>
+          <a:xfrm>
+            <a:off x="1943349" y="1175011"/>
+            <a:ext cx="520700" cy="419100"/>
+          </a:xfrm>
+          <a:prstGeom prst="hexagon">
+            <a:avLst/>
+          </a:prstGeom>
+          <a:solidFill>
+            <a:schemeClr val="accent4">
+              <a:lumMod val="50000"/>
+            </a:schemeClr>
+          </a:solidFill>
+          <a:ln>
+            <a:noFill/>
+          </a:ln>
+        </p:spPr>
+        <p:style>
+          <a:lnRef idx="2">
+            <a:schemeClr val="accent1">
+              <a:shade val="50000"/>
+            </a:schemeClr>
+          </a:lnRef>
+          <a:fillRef idx="1">
+            <a:schemeClr val="accent1"/>
+          </a:fillRef>
+          <a:effectRef idx="0">
+            <a:schemeClr val="accent1"/>
+          </a:effectRef>
+          <a:fontRef idx="minor">
+            <a:schemeClr val="lt1"/>
+          </a:fontRef>
+        </p:style>
+        <p:txBody>
+          <a:bodyPr rtlCol="0" anchor="ctr"/>
+          <a:lstStyle/>
+          <a:p>
+            <a:pPr algn="ctr"/>
+            <a:endParaRPr lang="en-GB"/>
+          </a:p>
+        </p:txBody>
+      </p:sp>
+      <p:sp>
+        <p:nvSpPr>
+          <p:cNvPr id="8" name="Cloud 7">
+            <a:extLst>
+              <a:ext uri="{FF2B5EF4-FFF2-40B4-BE49-F238E27FC236}">
+                <a16:creationId xmlns:a16="http://schemas.microsoft.com/office/drawing/2014/main" id="{C42CC265-1C7F-4954-907D-1E203B2FCD1F}"/>
+              </a:ext>
+            </a:extLst>
+          </p:cNvPr>
+          <p:cNvSpPr/>
+          <p:nvPr/>
+        </p:nvSpPr>
+        <p:spPr>
+          <a:xfrm>
+            <a:off x="742950" y="3333750"/>
+            <a:ext cx="3594100" cy="2819400"/>
+          </a:xfrm>
+          <a:prstGeom prst="cloud">
+            <a:avLst/>
+          </a:prstGeom>
+          <a:solidFill>
+            <a:srgbClr val="009644"/>
+          </a:solidFill>
+          <a:ln w="254000">
+            <a:solidFill>
+              <a:srgbClr val="006C31"/>
+            </a:solidFill>
+          </a:ln>
+        </p:spPr>
+        <p:style>
+          <a:lnRef idx="2">
+            <a:schemeClr val="accent1">
+              <a:shade val="50000"/>
+            </a:schemeClr>
+          </a:lnRef>
+          <a:fillRef idx="1">
+            <a:schemeClr val="accent1"/>
+          </a:fillRef>
+          <a:effectRef idx="0">
+            <a:schemeClr val="accent1"/>
+          </a:effectRef>
+          <a:fontRef idx="minor">
+            <a:schemeClr val="lt1"/>
+          </a:fontRef>
+        </p:style>
+        <p:txBody>
+          <a:bodyPr rtlCol="0" anchor="ctr"/>
+          <a:lstStyle/>
+          <a:p>
+            <a:pPr algn="ctr"/>
+            <a:endParaRPr lang="en-GB"/>
+          </a:p>
+        </p:txBody>
+      </p:sp>
+      <p:sp>
+        <p:nvSpPr>
+          <p:cNvPr id="10" name="Cloud 9">
+            <a:extLst>
+              <a:ext uri="{FF2B5EF4-FFF2-40B4-BE49-F238E27FC236}">
+                <a16:creationId xmlns:a16="http://schemas.microsoft.com/office/drawing/2014/main" id="{4C903C0B-EB2B-454F-A5FC-26894E380091}"/>
+              </a:ext>
+            </a:extLst>
+          </p:cNvPr>
+          <p:cNvSpPr/>
+          <p:nvPr/>
+        </p:nvSpPr>
+        <p:spPr>
+          <a:xfrm>
+            <a:off x="1543050" y="3814762"/>
+            <a:ext cx="2095500" cy="1765846"/>
+          </a:xfrm>
+          <a:prstGeom prst="cloud">
+            <a:avLst/>
+          </a:prstGeom>
+          <a:solidFill>
+            <a:srgbClr val="007E39"/>
+          </a:solidFill>
+          <a:ln w="127000">
+            <a:solidFill>
+              <a:srgbClr val="006C31"/>
+            </a:solidFill>
+          </a:ln>
+        </p:spPr>
+        <p:style>
+          <a:lnRef idx="2">
+            <a:schemeClr val="accent1">
+              <a:shade val="50000"/>
+            </a:schemeClr>
+          </a:lnRef>
+          <a:fillRef idx="1">
+            <a:schemeClr val="accent1"/>
+          </a:fillRef>
+          <a:effectRef idx="0">
+            <a:schemeClr val="accent1"/>
+          </a:effectRef>
+          <a:fontRef idx="minor">
+            <a:schemeClr val="lt1"/>
+          </a:fontRef>
+        </p:style>
+        <p:txBody>
+          <a:bodyPr rtlCol="0" anchor="ctr"/>
+          <a:lstStyle/>
+          <a:p>
+            <a:pPr algn="ctr"/>
+            <a:endParaRPr lang="en-GB"/>
+          </a:p>
+        </p:txBody>
+      </p:sp>
+      <p:sp>
+        <p:nvSpPr>
+          <p:cNvPr id="9" name="Cloud 8">
+            <a:extLst>
+              <a:ext uri="{FF2B5EF4-FFF2-40B4-BE49-F238E27FC236}">
+                <a16:creationId xmlns:a16="http://schemas.microsoft.com/office/drawing/2014/main" id="{D069D26F-D1C7-4D10-BB91-1043E2184AAD}"/>
+              </a:ext>
+            </a:extLst>
+          </p:cNvPr>
+          <p:cNvSpPr/>
+          <p:nvPr/>
+        </p:nvSpPr>
+        <p:spPr>
+          <a:xfrm>
+            <a:off x="2063750" y="4275398"/>
+            <a:ext cx="1079500" cy="782377"/>
+          </a:xfrm>
+          <a:prstGeom prst="cloud">
+            <a:avLst/>
+          </a:prstGeom>
+          <a:solidFill>
+            <a:srgbClr val="007E39"/>
+          </a:solidFill>
+          <a:ln w="127000">
+            <a:solidFill>
+              <a:srgbClr val="006C31"/>
+            </a:solidFill>
+          </a:ln>
+        </p:spPr>
+        <p:style>
+          <a:lnRef idx="2">
+            <a:schemeClr val="accent1">
+              <a:shade val="50000"/>
+            </a:schemeClr>
+          </a:lnRef>
+          <a:fillRef idx="1">
+            <a:schemeClr val="accent1"/>
+          </a:fillRef>
+          <a:effectRef idx="0">
+            <a:schemeClr val="accent1"/>
+          </a:effectRef>
+          <a:fontRef idx="minor">
+            <a:schemeClr val="lt1"/>
+          </a:fontRef>
+        </p:style>
+        <p:txBody>
+          <a:bodyPr rtlCol="0" anchor="ctr"/>
+          <a:lstStyle/>
+          <a:p>
+            <a:pPr algn="ctr"/>
+            <a:endParaRPr lang="en-GB"/>
+          </a:p>
+        </p:txBody>
+      </p:sp>
+      <p:sp>
+        <p:nvSpPr>
+          <p:cNvPr id="11" name="Star: 7 Points 10">
+            <a:extLst>
+              <a:ext uri="{FF2B5EF4-FFF2-40B4-BE49-F238E27FC236}">
+                <a16:creationId xmlns:a16="http://schemas.microsoft.com/office/drawing/2014/main" id="{DAE39633-DB62-41F6-B070-F1A60F421FE0}"/>
+              </a:ext>
+            </a:extLst>
+          </p:cNvPr>
+          <p:cNvSpPr/>
+          <p:nvPr/>
+        </p:nvSpPr>
+        <p:spPr>
+          <a:xfrm>
+            <a:off x="6057902" y="1304474"/>
+            <a:ext cx="3594100" cy="2819400"/>
+          </a:xfrm>
+          <a:prstGeom prst="star7">
+            <a:avLst/>
+          </a:prstGeom>
+          <a:solidFill>
+            <a:srgbClr val="009644"/>
+          </a:solidFill>
+          <a:ln w="254000">
+            <a:solidFill>
+              <a:srgbClr val="006C31"/>
+            </a:solidFill>
+          </a:ln>
+        </p:spPr>
+        <p:style>
+          <a:lnRef idx="2">
+            <a:schemeClr val="accent1">
+              <a:shade val="50000"/>
+            </a:schemeClr>
+          </a:lnRef>
+          <a:fillRef idx="1">
+            <a:schemeClr val="accent1"/>
+          </a:fillRef>
+          <a:effectRef idx="0">
+            <a:schemeClr val="accent1"/>
+          </a:effectRef>
+          <a:fontRef idx="minor">
+            <a:schemeClr val="lt1"/>
+          </a:fontRef>
+        </p:style>
+        <p:txBody>
+          <a:bodyPr rtlCol="0" anchor="ctr"/>
+          <a:lstStyle/>
+          <a:p>
+            <a:pPr algn="ctr"/>
+            <a:endParaRPr lang="en-GB"/>
+          </a:p>
+        </p:txBody>
+      </p:sp>
+      <p:sp>
+        <p:nvSpPr>
+          <p:cNvPr id="12" name="Star: 7 Points 11">
+            <a:extLst>
+              <a:ext uri="{FF2B5EF4-FFF2-40B4-BE49-F238E27FC236}">
+                <a16:creationId xmlns:a16="http://schemas.microsoft.com/office/drawing/2014/main" id="{6A4515E3-507A-4EF8-8D8F-A9DD3D87F4CF}"/>
+              </a:ext>
+            </a:extLst>
+          </p:cNvPr>
+          <p:cNvSpPr/>
+          <p:nvPr/>
+        </p:nvSpPr>
+        <p:spPr>
+          <a:xfrm>
+            <a:off x="6858002" y="1785486"/>
+            <a:ext cx="2095500" cy="1765846"/>
+          </a:xfrm>
+          <a:prstGeom prst="star7">
+            <a:avLst/>
+          </a:prstGeom>
+          <a:solidFill>
+            <a:srgbClr val="007E39"/>
+          </a:solidFill>
+          <a:ln w="127000">
+            <a:solidFill>
+              <a:srgbClr val="006C31"/>
+            </a:solidFill>
+          </a:ln>
+        </p:spPr>
+        <p:style>
+          <a:lnRef idx="2">
+            <a:schemeClr val="accent1">
+              <a:shade val="50000"/>
+            </a:schemeClr>
+          </a:lnRef>
+          <a:fillRef idx="1">
+            <a:schemeClr val="accent1"/>
+          </a:fillRef>
+          <a:effectRef idx="0">
+            <a:schemeClr val="accent1"/>
+          </a:effectRef>
+          <a:fontRef idx="minor">
+            <a:schemeClr val="lt1"/>
+          </a:fontRef>
+        </p:style>
+        <p:txBody>
+          <a:bodyPr rtlCol="0" anchor="ctr"/>
+          <a:lstStyle/>
+          <a:p>
+            <a:pPr algn="ctr"/>
+            <a:endParaRPr lang="en-GB"/>
+          </a:p>
+        </p:txBody>
+      </p:sp>
+      <p:sp>
+        <p:nvSpPr>
+          <p:cNvPr id="13" name="Star: 7 Points 12">
+            <a:extLst>
+              <a:ext uri="{FF2B5EF4-FFF2-40B4-BE49-F238E27FC236}">
+                <a16:creationId xmlns:a16="http://schemas.microsoft.com/office/drawing/2014/main" id="{66BDC168-0CF4-4729-A30E-4760F4031D54}"/>
+              </a:ext>
+            </a:extLst>
+          </p:cNvPr>
+          <p:cNvSpPr/>
+          <p:nvPr/>
+        </p:nvSpPr>
+        <p:spPr>
+          <a:xfrm>
+            <a:off x="7378702" y="2246122"/>
+            <a:ext cx="1079500" cy="782377"/>
+          </a:xfrm>
+          <a:prstGeom prst="star7">
+            <a:avLst/>
+          </a:prstGeom>
+          <a:solidFill>
+            <a:srgbClr val="007E39"/>
+          </a:solidFill>
+          <a:ln w="127000">
+            <a:solidFill>
+              <a:srgbClr val="006C31"/>
+            </a:solidFill>
+          </a:ln>
+        </p:spPr>
+        <p:style>
+          <a:lnRef idx="2">
+            <a:schemeClr val="accent1">
+              <a:shade val="50000"/>
+            </a:schemeClr>
+          </a:lnRef>
+          <a:fillRef idx="1">
+            <a:schemeClr val="accent1"/>
+          </a:fillRef>
+          <a:effectRef idx="0">
+            <a:schemeClr val="accent1"/>
+          </a:effectRef>
+          <a:fontRef idx="minor">
+            <a:schemeClr val="lt1"/>
+          </a:fontRef>
+        </p:style>
+        <p:txBody>
+          <a:bodyPr rtlCol="0" anchor="ctr"/>
+          <a:lstStyle/>
+          <a:p>
+            <a:pPr algn="ctr"/>
+            <a:endParaRPr lang="en-GB"/>
+          </a:p>
+        </p:txBody>
+      </p:sp>
+    </p:spTree>
+    <p:extLst>
+      <p:ext uri="{BB962C8B-B14F-4D97-AF65-F5344CB8AC3E}">
+        <p14:creationId xmlns:p14="http://schemas.microsoft.com/office/powerpoint/2010/main" val="1025106934"/>
+      </p:ext>
+    </p:extLst>
+  </p:cSld>
+  <p:clrMapOvr>
+    <a:masterClrMapping/>
+  </p:clrMapOvr>
+</p:sld>
+</file>
+
+<file path=ppt/slides/slide4.xml><?xml version="1.0" encoding="utf-8"?>
+<p:sld xmlns:a="http://schemas.openxmlformats.org/drawingml/2006/main" xmlns:r="http://schemas.openxmlformats.org/officeDocument/2006/relationships" xmlns:p="http://schemas.openxmlformats.org/presentationml/2006/main">
+  <p:cSld>
+    <p:spTree>
+      <p:nvGrpSpPr>
+        <p:cNvPr id="1" name=""/>
+        <p:cNvGrpSpPr/>
+        <p:nvPr/>
+      </p:nvGrpSpPr>
+      <p:grpSpPr>
+        <a:xfrm>
+          <a:off x="0" y="0"/>
+          <a:ext cx="0" cy="0"/>
+          <a:chOff x="0" y="0"/>
+          <a:chExt cx="0" cy="0"/>
+        </a:xfrm>
+      </p:grpSpPr>
+      <p:sp>
+        <p:nvSpPr>
           <p:cNvPr id="6" name="Moon 5">
             <a:extLst>
               <a:ext uri="{FF2B5EF4-FFF2-40B4-BE49-F238E27FC236}">
@@ -5584,7 +7282,7 @@
 </p:sld>
 </file>
 
-<file path=ppt/slides/slide3.xml><?xml version="1.0" encoding="utf-8"?>
+<file path=ppt/slides/slide5.xml><?xml version="1.0" encoding="utf-8"?>
 <p:sld xmlns:a="http://schemas.openxmlformats.org/drawingml/2006/main" xmlns:r="http://schemas.openxmlformats.org/officeDocument/2006/relationships" xmlns:p="http://schemas.openxmlformats.org/presentationml/2006/main">
   <p:cSld>
     <p:spTree>

</xml_diff>